<commit_message>
app de adicao de sugestao pronto
</commit_message>
<xml_diff>
--- a/Documentação/Apresentacao.pptx
+++ b/Documentação/Apresentacao.pptx
@@ -277,7 +277,7 @@
           <a:p>
             <a:fld id="{6099EA04-CD08-2640-B563-989C2ACFFEE4}" type="datetimeFigureOut">
               <a:rPr lang="en-US" smtClean="0"/>
-              <a:t>3/24/19</a:t>
+              <a:t>5/3/19</a:t>
             </a:fld>
             <a:endParaRPr lang="en-US"/>
           </a:p>
@@ -475,7 +475,7 @@
           <a:p>
             <a:fld id="{6099EA04-CD08-2640-B563-989C2ACFFEE4}" type="datetimeFigureOut">
               <a:rPr lang="en-US" smtClean="0"/>
-              <a:t>3/24/19</a:t>
+              <a:t>5/3/19</a:t>
             </a:fld>
             <a:endParaRPr lang="en-US"/>
           </a:p>
@@ -683,7 +683,7 @@
           <a:p>
             <a:fld id="{6099EA04-CD08-2640-B563-989C2ACFFEE4}" type="datetimeFigureOut">
               <a:rPr lang="en-US" smtClean="0"/>
-              <a:t>3/24/19</a:t>
+              <a:t>5/3/19</a:t>
             </a:fld>
             <a:endParaRPr lang="en-US"/>
           </a:p>
@@ -881,7 +881,7 @@
           <a:p>
             <a:fld id="{6099EA04-CD08-2640-B563-989C2ACFFEE4}" type="datetimeFigureOut">
               <a:rPr lang="en-US" smtClean="0"/>
-              <a:t>3/24/19</a:t>
+              <a:t>5/3/19</a:t>
             </a:fld>
             <a:endParaRPr lang="en-US"/>
           </a:p>
@@ -1156,7 +1156,7 @@
           <a:p>
             <a:fld id="{6099EA04-CD08-2640-B563-989C2ACFFEE4}" type="datetimeFigureOut">
               <a:rPr lang="en-US" smtClean="0"/>
-              <a:t>3/24/19</a:t>
+              <a:t>5/3/19</a:t>
             </a:fld>
             <a:endParaRPr lang="en-US"/>
           </a:p>
@@ -1421,7 +1421,7 @@
           <a:p>
             <a:fld id="{6099EA04-CD08-2640-B563-989C2ACFFEE4}" type="datetimeFigureOut">
               <a:rPr lang="en-US" smtClean="0"/>
-              <a:t>3/24/19</a:t>
+              <a:t>5/3/19</a:t>
             </a:fld>
             <a:endParaRPr lang="en-US"/>
           </a:p>
@@ -1833,7 +1833,7 @@
           <a:p>
             <a:fld id="{6099EA04-CD08-2640-B563-989C2ACFFEE4}" type="datetimeFigureOut">
               <a:rPr lang="en-US" smtClean="0"/>
-              <a:t>3/24/19</a:t>
+              <a:t>5/3/19</a:t>
             </a:fld>
             <a:endParaRPr lang="en-US"/>
           </a:p>
@@ -1974,7 +1974,7 @@
           <a:p>
             <a:fld id="{6099EA04-CD08-2640-B563-989C2ACFFEE4}" type="datetimeFigureOut">
               <a:rPr lang="en-US" smtClean="0"/>
-              <a:t>3/24/19</a:t>
+              <a:t>5/3/19</a:t>
             </a:fld>
             <a:endParaRPr lang="en-US"/>
           </a:p>
@@ -2087,7 +2087,7 @@
           <a:p>
             <a:fld id="{6099EA04-CD08-2640-B563-989C2ACFFEE4}" type="datetimeFigureOut">
               <a:rPr lang="en-US" smtClean="0"/>
-              <a:t>3/24/19</a:t>
+              <a:t>5/3/19</a:t>
             </a:fld>
             <a:endParaRPr lang="en-US"/>
           </a:p>
@@ -2398,7 +2398,7 @@
           <a:p>
             <a:fld id="{6099EA04-CD08-2640-B563-989C2ACFFEE4}" type="datetimeFigureOut">
               <a:rPr lang="en-US" smtClean="0"/>
-              <a:t>3/24/19</a:t>
+              <a:t>5/3/19</a:t>
             </a:fld>
             <a:endParaRPr lang="en-US"/>
           </a:p>
@@ -2686,7 +2686,7 @@
           <a:p>
             <a:fld id="{6099EA04-CD08-2640-B563-989C2ACFFEE4}" type="datetimeFigureOut">
               <a:rPr lang="en-US" smtClean="0"/>
-              <a:t>3/24/19</a:t>
+              <a:t>5/3/19</a:t>
             </a:fld>
             <a:endParaRPr lang="en-US"/>
           </a:p>
@@ -2927,7 +2927,7 @@
           <a:p>
             <a:fld id="{6099EA04-CD08-2640-B563-989C2ACFFEE4}" type="datetimeFigureOut">
               <a:rPr lang="en-US" smtClean="0"/>
-              <a:t>3/24/19</a:t>
+              <a:t>5/3/19</a:t>
             </a:fld>
             <a:endParaRPr lang="en-US"/>
           </a:p>
@@ -3430,18 +3430,18 @@
           <a:lstStyle/>
           <a:p>
             <a:r>
-              <a:rPr lang="en-US" dirty="0" err="1"/>
+              <a:rPr lang="en-US" err="1"/>
               <a:t>Sistemas</a:t>
             </a:r>
             <a:r>
-              <a:rPr lang="en-US" dirty="0"/>
+              <a:rPr lang="en-US"/>
               <a:t> de </a:t>
             </a:r>
             <a:r>
-              <a:rPr lang="en-US" dirty="0" err="1"/>
+              <a:rPr lang="en-US" err="1"/>
               <a:t>recomendações</a:t>
             </a:r>
-            <a:endParaRPr lang="en-US" dirty="0"/>
+            <a:endParaRPr lang="en-US"/>
           </a:p>
         </p:txBody>
       </p:sp>
@@ -3469,206 +3469,206 @@
           <a:lstStyle/>
           <a:p>
             <a:r>
-              <a:rPr lang="en-US" dirty="0" err="1"/>
+              <a:rPr lang="en-US" err="1"/>
               <a:t>Baseado</a:t>
             </a:r>
             <a:r>
-              <a:rPr lang="en-US" dirty="0"/>
+              <a:rPr lang="en-US"/>
               <a:t> </a:t>
             </a:r>
             <a:r>
-              <a:rPr lang="en-US" dirty="0" err="1"/>
+              <a:rPr lang="en-US" err="1"/>
               <a:t>em</a:t>
             </a:r>
             <a:r>
-              <a:rPr lang="en-US" dirty="0"/>
+              <a:rPr lang="en-US"/>
               <a:t>: </a:t>
             </a:r>
             <a:r>
-              <a:rPr lang="en-US" dirty="0">
+              <a:rPr lang="en-US">
                 <a:hlinkClick r:id="rId2"/>
               </a:rPr>
               <a:t>https://www.ibm.com/developerworks/br/cloud/sugestao-entretenimento-computacao-cognitiva/index.html</a:t>
             </a:r>
-            <a:endParaRPr lang="en-US" dirty="0"/>
-          </a:p>
-          <a:p>
-            <a:r>
-              <a:rPr lang="en-US" dirty="0"/>
+            <a:endParaRPr lang="en-US"/>
+          </a:p>
+          <a:p>
+            <a:r>
+              <a:rPr lang="en-US"/>
               <a:t>Dados </a:t>
             </a:r>
             <a:r>
-              <a:rPr lang="en-US" dirty="0" err="1"/>
+              <a:rPr lang="en-US" err="1"/>
               <a:t>são</a:t>
             </a:r>
             <a:r>
-              <a:rPr lang="en-US" dirty="0"/>
+              <a:rPr lang="en-US"/>
               <a:t> </a:t>
             </a:r>
             <a:r>
-              <a:rPr lang="en-US" dirty="0" err="1"/>
+              <a:rPr lang="en-US" err="1"/>
               <a:t>coletados</a:t>
             </a:r>
             <a:r>
-              <a:rPr lang="en-US" dirty="0"/>
+              <a:rPr lang="en-US"/>
               <a:t> de um Sistema de feedbacks (</a:t>
             </a:r>
             <a:r>
-              <a:rPr lang="en-US" dirty="0" err="1"/>
+              <a:rPr lang="en-US" err="1"/>
               <a:t>reclame</a:t>
             </a:r>
             <a:r>
-              <a:rPr lang="en-US" dirty="0"/>
+              <a:rPr lang="en-US"/>
               <a:t> </a:t>
             </a:r>
             <a:r>
-              <a:rPr lang="en-US" dirty="0" err="1"/>
+              <a:rPr lang="en-US" err="1"/>
               <a:t>aqui</a:t>
             </a:r>
             <a:r>
-              <a:rPr lang="en-US" dirty="0"/>
+              <a:rPr lang="en-US"/>
               <a:t>, </a:t>
             </a:r>
             <a:r>
-              <a:rPr lang="en-US" dirty="0" err="1"/>
+              <a:rPr lang="en-US" err="1"/>
               <a:t>imdb</a:t>
             </a:r>
             <a:r>
-              <a:rPr lang="en-US" dirty="0"/>
+              <a:rPr lang="en-US"/>
               <a:t>…) </a:t>
             </a:r>
             <a:r>
-              <a:rPr lang="en-US" dirty="0" err="1"/>
+              <a:rPr lang="en-US" err="1"/>
               <a:t>por</a:t>
             </a:r>
             <a:r>
-              <a:rPr lang="en-US" dirty="0"/>
+              <a:rPr lang="en-US"/>
               <a:t> um web crawler</a:t>
             </a:r>
           </a:p>
           <a:p>
             <a:r>
-              <a:rPr lang="en-US" dirty="0"/>
+              <a:rPr lang="en-US"/>
               <a:t>Dos dados </a:t>
             </a:r>
             <a:r>
-              <a:rPr lang="en-US" dirty="0" err="1"/>
+              <a:rPr lang="en-US" err="1"/>
               <a:t>coletados</a:t>
             </a:r>
             <a:r>
-              <a:rPr lang="en-US" dirty="0"/>
+              <a:rPr lang="en-US"/>
               <a:t>, </a:t>
             </a:r>
             <a:r>
-              <a:rPr lang="en-US" dirty="0" err="1"/>
+              <a:rPr lang="en-US" err="1"/>
               <a:t>são</a:t>
             </a:r>
             <a:r>
-              <a:rPr lang="en-US" dirty="0"/>
+              <a:rPr lang="en-US"/>
               <a:t> </a:t>
             </a:r>
             <a:r>
-              <a:rPr lang="en-US" dirty="0" err="1"/>
+              <a:rPr lang="en-US" err="1"/>
               <a:t>filtrados</a:t>
             </a:r>
             <a:r>
-              <a:rPr lang="en-US" dirty="0"/>
+              <a:rPr lang="en-US"/>
               <a:t> </a:t>
             </a:r>
             <a:r>
-              <a:rPr lang="en-US" dirty="0" err="1"/>
+              <a:rPr lang="en-US" err="1"/>
               <a:t>os</a:t>
             </a:r>
             <a:r>
-              <a:rPr lang="en-US" dirty="0"/>
+              <a:rPr lang="en-US"/>
               <a:t> feedbacks </a:t>
             </a:r>
             <a:r>
-              <a:rPr lang="en-US" dirty="0" err="1"/>
+              <a:rPr lang="en-US" err="1"/>
               <a:t>positivos</a:t>
             </a:r>
             <a:r>
-              <a:rPr lang="en-US" dirty="0"/>
+              <a:rPr lang="en-US"/>
               <a:t> e </a:t>
             </a:r>
             <a:r>
-              <a:rPr lang="en-US" dirty="0" err="1"/>
+              <a:rPr lang="en-US" err="1"/>
               <a:t>estes</a:t>
             </a:r>
             <a:r>
-              <a:rPr lang="en-US" dirty="0"/>
+              <a:rPr lang="en-US"/>
               <a:t> </a:t>
             </a:r>
             <a:r>
-              <a:rPr lang="en-US" dirty="0" err="1"/>
+              <a:rPr lang="en-US" err="1"/>
               <a:t>são</a:t>
             </a:r>
             <a:r>
-              <a:rPr lang="en-US" dirty="0"/>
+              <a:rPr lang="en-US"/>
               <a:t> </a:t>
             </a:r>
             <a:r>
-              <a:rPr lang="en-US" dirty="0" err="1"/>
+              <a:rPr lang="en-US" err="1"/>
               <a:t>enviados</a:t>
             </a:r>
             <a:r>
-              <a:rPr lang="en-US" dirty="0"/>
+              <a:rPr lang="en-US"/>
               <a:t> para um </a:t>
             </a:r>
             <a:r>
-              <a:rPr lang="en-US" dirty="0" err="1"/>
+              <a:rPr lang="en-US" err="1"/>
               <a:t>objeto</a:t>
             </a:r>
             <a:r>
-              <a:rPr lang="en-US" dirty="0"/>
+              <a:rPr lang="en-US"/>
               <a:t> JSON</a:t>
             </a:r>
           </a:p>
           <a:p>
             <a:r>
-              <a:rPr lang="en-US" dirty="0"/>
+              <a:rPr lang="en-US"/>
               <a:t>O JSON </a:t>
             </a:r>
             <a:r>
-              <a:rPr lang="en-US" dirty="0" err="1"/>
+              <a:rPr lang="en-US" err="1"/>
               <a:t>é</a:t>
             </a:r>
             <a:r>
-              <a:rPr lang="en-US" dirty="0"/>
+              <a:rPr lang="en-US"/>
               <a:t> </a:t>
             </a:r>
             <a:r>
-              <a:rPr lang="en-US" dirty="0" err="1"/>
+              <a:rPr lang="en-US" err="1"/>
               <a:t>enviado</a:t>
             </a:r>
             <a:r>
-              <a:rPr lang="en-US" dirty="0"/>
+              <a:rPr lang="en-US"/>
               <a:t> para o Watson Personality Insights que </a:t>
             </a:r>
             <a:r>
-              <a:rPr lang="en-US" dirty="0" err="1"/>
+              <a:rPr lang="en-US" err="1"/>
               <a:t>cria</a:t>
             </a:r>
             <a:r>
-              <a:rPr lang="en-US" dirty="0"/>
+              <a:rPr lang="en-US"/>
               <a:t> um </a:t>
             </a:r>
             <a:r>
-              <a:rPr lang="en-US" dirty="0" err="1"/>
+              <a:rPr lang="en-US" err="1"/>
               <a:t>perfil</a:t>
             </a:r>
             <a:r>
-              <a:rPr lang="en-US" dirty="0"/>
+              <a:rPr lang="en-US"/>
               <a:t> de </a:t>
             </a:r>
             <a:r>
-              <a:rPr lang="en-US" dirty="0" err="1"/>
+              <a:rPr lang="en-US" err="1"/>
               <a:t>consumidor</a:t>
             </a:r>
-            <a:endParaRPr lang="en-US" dirty="0"/>
-          </a:p>
-          <a:p>
-            <a:endParaRPr lang="en-US" dirty="0"/>
+            <a:endParaRPr lang="en-US"/>
+          </a:p>
+          <a:p>
+            <a:endParaRPr lang="en-US"/>
           </a:p>
         </p:txBody>
       </p:sp>
@@ -3724,18 +3724,18 @@
           <a:lstStyle/>
           <a:p>
             <a:r>
-              <a:rPr lang="en-US" dirty="0" err="1"/>
+              <a:rPr lang="en-US" err="1"/>
               <a:t>Sistemas</a:t>
             </a:r>
             <a:r>
-              <a:rPr lang="en-US" dirty="0"/>
+              <a:rPr lang="en-US"/>
               <a:t> de </a:t>
             </a:r>
             <a:r>
-              <a:rPr lang="en-US" dirty="0" err="1"/>
+              <a:rPr lang="en-US" err="1"/>
               <a:t>recomendações</a:t>
             </a:r>
-            <a:endParaRPr lang="en-US" dirty="0"/>
+            <a:endParaRPr lang="en-US"/>
           </a:p>
         </p:txBody>
       </p:sp>
@@ -3763,363 +3763,363 @@
           <a:lstStyle/>
           <a:p>
             <a:r>
-              <a:rPr lang="en-US" dirty="0"/>
+              <a:rPr lang="en-US"/>
               <a:t>O </a:t>
             </a:r>
             <a:r>
-              <a:rPr lang="en-US" dirty="0" err="1"/>
+              <a:rPr lang="en-US" err="1"/>
               <a:t>perfil</a:t>
             </a:r>
             <a:r>
-              <a:rPr lang="en-US" dirty="0"/>
+              <a:rPr lang="en-US"/>
               <a:t> do </a:t>
             </a:r>
             <a:r>
-              <a:rPr lang="en-US" dirty="0" err="1"/>
+              <a:rPr lang="en-US" err="1"/>
               <a:t>usuário</a:t>
             </a:r>
             <a:r>
-              <a:rPr lang="en-US" dirty="0"/>
+              <a:rPr lang="en-US"/>
               <a:t> </a:t>
             </a:r>
             <a:r>
-              <a:rPr lang="en-US" dirty="0" err="1"/>
+              <a:rPr lang="en-US" err="1"/>
               <a:t>é</a:t>
             </a:r>
             <a:r>
-              <a:rPr lang="en-US" dirty="0"/>
+              <a:rPr lang="en-US"/>
               <a:t> </a:t>
             </a:r>
             <a:r>
-              <a:rPr lang="en-US" dirty="0" err="1"/>
+              <a:rPr lang="en-US" err="1"/>
               <a:t>comparado</a:t>
             </a:r>
             <a:r>
-              <a:rPr lang="en-US" dirty="0"/>
+              <a:rPr lang="en-US"/>
               <a:t> com o </a:t>
             </a:r>
             <a:r>
-              <a:rPr lang="en-US" dirty="0" err="1"/>
+              <a:rPr lang="en-US" err="1"/>
               <a:t>perfil</a:t>
             </a:r>
             <a:r>
-              <a:rPr lang="en-US" dirty="0"/>
+              <a:rPr lang="en-US"/>
               <a:t> de </a:t>
             </a:r>
             <a:r>
-              <a:rPr lang="en-US" dirty="0" err="1"/>
+              <a:rPr lang="en-US" err="1"/>
               <a:t>consumidor</a:t>
             </a:r>
             <a:r>
-              <a:rPr lang="en-US" dirty="0"/>
+              <a:rPr lang="en-US"/>
               <a:t> de um </a:t>
             </a:r>
             <a:r>
-              <a:rPr lang="en-US" dirty="0" err="1"/>
+              <a:rPr lang="en-US" err="1"/>
               <a:t>vetor</a:t>
             </a:r>
             <a:r>
-              <a:rPr lang="en-US" dirty="0"/>
+              <a:rPr lang="en-US"/>
               <a:t> de </a:t>
             </a:r>
             <a:r>
-              <a:rPr lang="en-US" dirty="0" err="1"/>
+              <a:rPr lang="en-US" err="1"/>
               <a:t>possíveis</a:t>
             </a:r>
             <a:r>
-              <a:rPr lang="en-US" dirty="0"/>
+              <a:rPr lang="en-US"/>
               <a:t> </a:t>
             </a:r>
             <a:r>
-              <a:rPr lang="en-US" dirty="0" err="1"/>
+              <a:rPr lang="en-US" err="1"/>
               <a:t>sugestões</a:t>
             </a:r>
-            <a:endParaRPr lang="en-US" dirty="0"/>
-          </a:p>
-          <a:p>
-            <a:r>
-              <a:rPr lang="en-US" dirty="0"/>
+            <a:endParaRPr lang="en-US"/>
+          </a:p>
+          <a:p>
+            <a:r>
+              <a:rPr lang="en-US"/>
               <a:t>O </a:t>
             </a:r>
             <a:r>
-              <a:rPr lang="en-US" dirty="0" err="1"/>
+              <a:rPr lang="en-US" err="1"/>
               <a:t>resultado</a:t>
             </a:r>
             <a:r>
-              <a:rPr lang="en-US" dirty="0"/>
+              <a:rPr lang="en-US"/>
               <a:t> </a:t>
             </a:r>
             <a:r>
-              <a:rPr lang="en-US" dirty="0" err="1"/>
+              <a:rPr lang="en-US" err="1"/>
               <a:t>desta</a:t>
             </a:r>
             <a:r>
-              <a:rPr lang="en-US" dirty="0"/>
+              <a:rPr lang="en-US"/>
               <a:t> </a:t>
             </a:r>
             <a:r>
-              <a:rPr lang="en-US" dirty="0" err="1"/>
+              <a:rPr lang="en-US" err="1"/>
               <a:t>comparação</a:t>
             </a:r>
             <a:r>
-              <a:rPr lang="en-US" dirty="0"/>
+              <a:rPr lang="en-US"/>
               <a:t> </a:t>
             </a:r>
             <a:r>
-              <a:rPr lang="en-US" dirty="0" err="1"/>
+              <a:rPr lang="en-US" err="1"/>
               <a:t>é</a:t>
             </a:r>
             <a:r>
-              <a:rPr lang="en-US" dirty="0"/>
+              <a:rPr lang="en-US"/>
               <a:t> um </a:t>
             </a:r>
             <a:r>
-              <a:rPr lang="en-US" dirty="0" err="1"/>
+              <a:rPr lang="en-US" err="1"/>
               <a:t>vetor</a:t>
             </a:r>
             <a:r>
-              <a:rPr lang="en-US" dirty="0"/>
+              <a:rPr lang="en-US"/>
               <a:t> </a:t>
             </a:r>
             <a:r>
-              <a:rPr lang="en-US" dirty="0" err="1"/>
+              <a:rPr lang="en-US" err="1"/>
               <a:t>ordenado</a:t>
             </a:r>
             <a:r>
-              <a:rPr lang="en-US" dirty="0"/>
+              <a:rPr lang="en-US"/>
               <a:t> </a:t>
             </a:r>
             <a:r>
-              <a:rPr lang="en-US" dirty="0" err="1"/>
+              <a:rPr lang="en-US" err="1"/>
               <a:t>similaridade</a:t>
             </a:r>
             <a:r>
-              <a:rPr lang="en-US" dirty="0"/>
+              <a:rPr lang="en-US"/>
               <a:t> com o </a:t>
             </a:r>
             <a:r>
-              <a:rPr lang="en-US" dirty="0" err="1"/>
+              <a:rPr lang="en-US" err="1"/>
               <a:t>perfil</a:t>
             </a:r>
             <a:r>
-              <a:rPr lang="en-US" dirty="0"/>
+              <a:rPr lang="en-US"/>
               <a:t> do </a:t>
             </a:r>
             <a:r>
-              <a:rPr lang="en-US" dirty="0" err="1"/>
+              <a:rPr lang="en-US" err="1"/>
               <a:t>usuário</a:t>
             </a:r>
-            <a:endParaRPr lang="en-US" dirty="0"/>
-          </a:p>
-          <a:p>
-            <a:r>
-              <a:rPr lang="en-US" dirty="0" err="1"/>
+            <a:endParaRPr lang="en-US"/>
+          </a:p>
+          <a:p>
+            <a:r>
+              <a:rPr lang="en-US" err="1"/>
               <a:t>Os</a:t>
             </a:r>
             <a:r>
-              <a:rPr lang="en-US" dirty="0"/>
+              <a:rPr lang="en-US"/>
               <a:t> </a:t>
             </a:r>
             <a:r>
-              <a:rPr lang="en-US" dirty="0" err="1"/>
+              <a:rPr lang="en-US" err="1"/>
               <a:t>indicadores</a:t>
             </a:r>
             <a:r>
-              <a:rPr lang="en-US" dirty="0"/>
+              <a:rPr lang="en-US"/>
               <a:t> do </a:t>
             </a:r>
             <a:r>
-              <a:rPr lang="en-US" dirty="0" err="1"/>
+              <a:rPr lang="en-US" err="1"/>
               <a:t>perfil</a:t>
             </a:r>
             <a:r>
-              <a:rPr lang="en-US" dirty="0"/>
+              <a:rPr lang="en-US"/>
               <a:t> a </a:t>
             </a:r>
             <a:r>
-              <a:rPr lang="en-US" dirty="0" err="1"/>
+              <a:rPr lang="en-US" err="1"/>
               <a:t>serem</a:t>
             </a:r>
             <a:r>
-              <a:rPr lang="en-US" dirty="0"/>
+              <a:rPr lang="en-US"/>
               <a:t> </a:t>
             </a:r>
             <a:r>
-              <a:rPr lang="en-US" dirty="0" err="1"/>
+              <a:rPr lang="en-US" err="1"/>
               <a:t>comparados</a:t>
             </a:r>
             <a:r>
-              <a:rPr lang="en-US" dirty="0"/>
+              <a:rPr lang="en-US"/>
               <a:t> </a:t>
             </a:r>
             <a:r>
-              <a:rPr lang="en-US" dirty="0" err="1"/>
+              <a:rPr lang="en-US" err="1"/>
               <a:t>mudam</a:t>
             </a:r>
             <a:r>
-              <a:rPr lang="en-US" dirty="0"/>
+              <a:rPr lang="en-US"/>
               <a:t> de </a:t>
             </a:r>
             <a:r>
-              <a:rPr lang="en-US" dirty="0" err="1"/>
+              <a:rPr lang="en-US" err="1"/>
               <a:t>acordo</a:t>
             </a:r>
             <a:r>
-              <a:rPr lang="en-US" dirty="0"/>
+              <a:rPr lang="en-US"/>
               <a:t> com o </a:t>
             </a:r>
             <a:r>
-              <a:rPr lang="en-US" dirty="0" err="1"/>
+              <a:rPr lang="en-US" err="1"/>
               <a:t>filtro</a:t>
             </a:r>
             <a:r>
-              <a:rPr lang="en-US" dirty="0"/>
+              <a:rPr lang="en-US"/>
               <a:t> “</a:t>
             </a:r>
             <a:r>
-              <a:rPr lang="en-US" dirty="0" err="1"/>
+              <a:rPr lang="en-US" err="1"/>
               <a:t>opções</a:t>
             </a:r>
             <a:r>
-              <a:rPr lang="en-US" dirty="0"/>
+              <a:rPr lang="en-US"/>
               <a:t> </a:t>
             </a:r>
             <a:r>
-              <a:rPr lang="en-US" dirty="0" err="1"/>
+              <a:rPr lang="en-US" err="1"/>
               <a:t>refinadas</a:t>
             </a:r>
             <a:r>
-              <a:rPr lang="en-US" dirty="0"/>
+              <a:rPr lang="en-US"/>
               <a:t>” </a:t>
             </a:r>
             <a:r>
-              <a:rPr lang="en-US" dirty="0" err="1"/>
+              <a:rPr lang="en-US" err="1"/>
               <a:t>na</a:t>
             </a:r>
             <a:r>
-              <a:rPr lang="en-US" dirty="0"/>
+              <a:rPr lang="en-US"/>
               <a:t> </a:t>
             </a:r>
             <a:r>
-              <a:rPr lang="en-US" dirty="0" err="1"/>
+              <a:rPr lang="en-US" err="1"/>
               <a:t>busca</a:t>
             </a:r>
             <a:r>
-              <a:rPr lang="en-US" dirty="0"/>
+              <a:rPr lang="en-US"/>
               <a:t> </a:t>
             </a:r>
             <a:r>
-              <a:rPr lang="en-US" dirty="0" err="1"/>
+              <a:rPr lang="en-US" err="1"/>
               <a:t>feita</a:t>
             </a:r>
             <a:r>
-              <a:rPr lang="en-US" dirty="0"/>
+              <a:rPr lang="en-US"/>
               <a:t> </a:t>
             </a:r>
             <a:r>
-              <a:rPr lang="en-US" dirty="0" err="1"/>
+              <a:rPr lang="en-US" err="1"/>
               <a:t>pelo</a:t>
             </a:r>
             <a:r>
-              <a:rPr lang="en-US" dirty="0"/>
+              <a:rPr lang="en-US"/>
               <a:t> </a:t>
             </a:r>
             <a:r>
-              <a:rPr lang="en-US" dirty="0" err="1"/>
+              <a:rPr lang="en-US" err="1"/>
               <a:t>usuário</a:t>
             </a:r>
             <a:r>
-              <a:rPr lang="en-US" dirty="0"/>
+              <a:rPr lang="en-US"/>
               <a:t>.</a:t>
             </a:r>
           </a:p>
           <a:p>
             <a:r>
-              <a:rPr lang="en-US" dirty="0" err="1"/>
+              <a:rPr lang="en-US" err="1"/>
               <a:t>Esses</a:t>
             </a:r>
             <a:r>
-              <a:rPr lang="en-US" dirty="0"/>
+              <a:rPr lang="en-US"/>
               <a:t> </a:t>
             </a:r>
             <a:r>
-              <a:rPr lang="en-US" dirty="0" err="1"/>
+              <a:rPr lang="en-US" err="1"/>
               <a:t>filtros</a:t>
             </a:r>
             <a:r>
-              <a:rPr lang="en-US" dirty="0"/>
+              <a:rPr lang="en-US"/>
               <a:t> </a:t>
             </a:r>
             <a:r>
-              <a:rPr lang="en-US" dirty="0" err="1"/>
+              <a:rPr lang="en-US" err="1"/>
               <a:t>também</a:t>
             </a:r>
             <a:r>
-              <a:rPr lang="en-US" dirty="0"/>
+              <a:rPr lang="en-US"/>
               <a:t>, </a:t>
             </a:r>
             <a:r>
-              <a:rPr lang="en-US" dirty="0" err="1"/>
+              <a:rPr lang="en-US" err="1"/>
               <a:t>retiram</a:t>
             </a:r>
             <a:r>
-              <a:rPr lang="en-US" dirty="0"/>
+              <a:rPr lang="en-US"/>
               <a:t> do </a:t>
             </a:r>
             <a:r>
-              <a:rPr lang="en-US" dirty="0" err="1"/>
+              <a:rPr lang="en-US" err="1"/>
               <a:t>vetor</a:t>
             </a:r>
             <a:r>
-              <a:rPr lang="en-US" dirty="0"/>
+              <a:rPr lang="en-US"/>
               <a:t> as </a:t>
             </a:r>
             <a:r>
-              <a:rPr lang="en-US" dirty="0" err="1"/>
+              <a:rPr lang="en-US" err="1"/>
               <a:t>categorias</a:t>
             </a:r>
             <a:r>
-              <a:rPr lang="en-US" dirty="0"/>
+              <a:rPr lang="en-US"/>
               <a:t> de </a:t>
             </a:r>
             <a:r>
-              <a:rPr lang="en-US" dirty="0" err="1"/>
+              <a:rPr lang="en-US" err="1"/>
               <a:t>sugestão</a:t>
             </a:r>
             <a:r>
-              <a:rPr lang="en-US" dirty="0"/>
+              <a:rPr lang="en-US"/>
               <a:t> </a:t>
             </a:r>
             <a:r>
-              <a:rPr lang="en-US" dirty="0" err="1"/>
+              <a:rPr lang="en-US" err="1"/>
               <a:t>não</a:t>
             </a:r>
             <a:r>
-              <a:rPr lang="en-US" dirty="0"/>
+              <a:rPr lang="en-US"/>
               <a:t> </a:t>
             </a:r>
             <a:r>
-              <a:rPr lang="en-US" dirty="0" err="1"/>
+              <a:rPr lang="en-US" err="1"/>
               <a:t>selecionadas</a:t>
             </a:r>
             <a:r>
-              <a:rPr lang="en-US" dirty="0"/>
+              <a:rPr lang="en-US"/>
               <a:t> </a:t>
             </a:r>
             <a:r>
-              <a:rPr lang="en-US" dirty="0" err="1"/>
+              <a:rPr lang="en-US" err="1"/>
               <a:t>pelo</a:t>
             </a:r>
             <a:r>
-              <a:rPr lang="en-US" dirty="0"/>
+              <a:rPr lang="en-US"/>
               <a:t> </a:t>
             </a:r>
             <a:r>
-              <a:rPr lang="en-US" dirty="0" err="1"/>
+              <a:rPr lang="en-US" err="1"/>
               <a:t>usuário</a:t>
             </a:r>
             <a:r>
-              <a:rPr lang="en-US" dirty="0"/>
+              <a:rPr lang="en-US"/>
               <a:t>.</a:t>
             </a:r>
           </a:p>
@@ -4183,7 +4183,7 @@
           <a:p>
             <a:pPr algn="ctr"/>
             <a:r>
-              <a:rPr lang="en-US" dirty="0"/>
+              <a:rPr lang="en-US"/>
               <a:t>O APLICATIVO</a:t>
             </a:r>
           </a:p>
@@ -4248,14 +4248,14 @@
           <a:lstStyle/>
           <a:p>
             <a:r>
-              <a:rPr lang="en-US" sz="4000" kern="1200" dirty="0" err="1">
+              <a:rPr lang="en-US" sz="4000" kern="1200" err="1">
                 <a:latin typeface="+mj-lt"/>
                 <a:ea typeface="+mj-ea"/>
                 <a:cs typeface="+mj-cs"/>
               </a:rPr>
               <a:t>Ambiente</a:t>
             </a:r>
-            <a:endParaRPr lang="en-US" sz="4000" kern="1200" dirty="0">
+            <a:endParaRPr lang="en-US" sz="4000" kern="1200">
               <a:latin typeface="+mj-lt"/>
               <a:ea typeface="+mj-ea"/>
               <a:cs typeface="+mj-cs"/>
@@ -4292,46 +4292,46 @@
           <a:lstStyle/>
           <a:p>
             <a:r>
-              <a:rPr lang="en-US" sz="2000" dirty="0" err="1"/>
+              <a:rPr lang="en-US" sz="2000" err="1"/>
               <a:t>Linguagem</a:t>
             </a:r>
             <a:r>
-              <a:rPr lang="en-US" sz="2000" dirty="0"/>
+              <a:rPr lang="en-US" sz="2000"/>
               <a:t>: Swift 4.2</a:t>
             </a:r>
           </a:p>
           <a:p>
             <a:r>
-              <a:rPr lang="en-US" sz="2000" dirty="0" err="1"/>
+              <a:rPr lang="en-US" sz="2000" err="1"/>
               <a:t>Simulador</a:t>
             </a:r>
             <a:r>
-              <a:rPr lang="en-US" sz="2000" dirty="0"/>
+              <a:rPr lang="en-US" sz="2000"/>
               <a:t>: iPhone XR</a:t>
             </a:r>
           </a:p>
           <a:p>
             <a:r>
-              <a:rPr lang="en-US" sz="2000" dirty="0"/>
+              <a:rPr lang="en-US" sz="2000"/>
               <a:t>IDE: </a:t>
             </a:r>
             <a:r>
-              <a:rPr lang="en-US" sz="2000" dirty="0" err="1"/>
+              <a:rPr lang="en-US" sz="2000" err="1"/>
               <a:t>Xcode</a:t>
             </a:r>
             <a:r>
-              <a:rPr lang="en-US" sz="2000" dirty="0"/>
+              <a:rPr lang="en-US" sz="2000"/>
               <a:t> 10.1</a:t>
             </a:r>
           </a:p>
           <a:p>
             <a:r>
-              <a:rPr lang="en-US" sz="2000" dirty="0"/>
+              <a:rPr lang="en-US" sz="2000"/>
               <a:t>Banco de Dados: Firebase</a:t>
             </a:r>
           </a:p>
           <a:p>
-            <a:endParaRPr lang="en-US" sz="2000" dirty="0"/>
+            <a:endParaRPr lang="en-US" sz="2000"/>
           </a:p>
         </p:txBody>
       </p:sp>
@@ -5795,7 +5795,7 @@
           <a:p>
             <a:pPr algn="ctr"/>
             <a:r>
-              <a:rPr lang="en-US" dirty="0"/>
+              <a:rPr lang="en-US"/>
               <a:t>TESTES</a:t>
             </a:r>
           </a:p>
@@ -5959,7 +5959,7 @@
           </a:lstStyle>
           <a:p>
             <a:r>
-              <a:rPr lang="en-US" dirty="0"/>
+              <a:rPr lang="en-US"/>
               <a:t>CONSIDERAÇÕES FINAIS</a:t>
             </a:r>
           </a:p>
@@ -6394,7 +6394,7 @@
               <a:rPr lang="en-US" dirty="0" err="1"/>
               <a:t>Escopo</a:t>
             </a:r>
-            <a:endParaRPr lang="en-US" dirty="0"/>
+            <a:endParaRPr lang="en-US"/>
           </a:p>
         </p:txBody>
       </p:sp>
@@ -6419,7 +6419,7 @@
           <a:bodyPr/>
           <a:lstStyle/>
           <a:p>
-            <a:endParaRPr lang="en-US" dirty="0"/>
+            <a:endParaRPr lang="en-US"/>
           </a:p>
         </p:txBody>
       </p:sp>
@@ -7349,95 +7349,6 @@
           </a:p>
         </p:txBody>
       </p:sp>
-      <p:sp>
-        <p:nvSpPr>
-          <p:cNvPr id="18" name="Title 1">
-            <a:extLst>
-              <a:ext uri="{FF2B5EF4-FFF2-40B4-BE49-F238E27FC236}">
-                <a16:creationId xmlns:a16="http://schemas.microsoft.com/office/drawing/2014/main" id="{633CCA60-AA89-6E44-8798-35EB874721FA}"/>
-              </a:ext>
-            </a:extLst>
-          </p:cNvPr>
-          <p:cNvSpPr txBox="1">
-            <a:spLocks/>
-          </p:cNvSpPr>
-          <p:nvPr/>
-        </p:nvSpPr>
-        <p:spPr>
-          <a:xfrm>
-            <a:off x="0" y="365125"/>
-            <a:ext cx="12192000" cy="1325563"/>
-          </a:xfrm>
-          <a:prstGeom prst="rect">
-            <a:avLst/>
-          </a:prstGeom>
-        </p:spPr>
-        <p:txBody>
-          <a:bodyPr vert="horz" lIns="91440" tIns="45720" rIns="91440" bIns="45720" rtlCol="0" anchor="ctr">
-            <a:normAutofit/>
-          </a:bodyPr>
-          <a:lstStyle>
-            <a:lvl1pPr algn="l" defTabSz="914400" rtl="0" eaLnBrk="1" latinLnBrk="0" hangingPunct="1">
-              <a:lnSpc>
-                <a:spcPct val="90000"/>
-              </a:lnSpc>
-              <a:spcBef>
-                <a:spcPct val="0"/>
-              </a:spcBef>
-              <a:buNone/>
-              <a:defRPr sz="4400" kern="1200">
-                <a:solidFill>
-                  <a:schemeClr val="tx1"/>
-                </a:solidFill>
-                <a:latin typeface="+mj-lt"/>
-                <a:ea typeface="+mj-ea"/>
-                <a:cs typeface="+mj-cs"/>
-              </a:defRPr>
-            </a:lvl1pPr>
-          </a:lstStyle>
-          <a:p>
-            <a:pPr algn="ctr"/>
-            <a:r>
-              <a:rPr lang="en-US" dirty="0" err="1"/>
-              <a:t>Coleta</a:t>
-            </a:r>
-            <a:r>
-              <a:rPr lang="en-US" dirty="0"/>
-              <a:t> de </a:t>
-            </a:r>
-            <a:r>
-              <a:rPr lang="en-US" dirty="0" err="1"/>
-              <a:t>caracteristicas</a:t>
-            </a:r>
-            <a:r>
-              <a:rPr lang="en-US" dirty="0"/>
-              <a:t> da </a:t>
-            </a:r>
-            <a:r>
-              <a:rPr lang="en-US" dirty="0" err="1"/>
-              <a:t>personalidade</a:t>
-            </a:r>
-            <a:r>
-              <a:rPr lang="en-US" dirty="0"/>
-              <a:t> do </a:t>
-            </a:r>
-            <a:r>
-              <a:rPr lang="en-US" dirty="0" err="1"/>
-              <a:t>usuário</a:t>
-            </a:r>
-            <a:endParaRPr lang="en-US" dirty="0">
-              <a:ln w="0"/>
-              <a:effectLst>
-                <a:outerShdw blurRad="38100" dist="19050" dir="2700000" algn="tl" rotWithShape="0">
-                  <a:schemeClr val="dk1">
-                    <a:alpha val="40000"/>
-                  </a:schemeClr>
-                </a:outerShdw>
-              </a:effectLst>
-            </a:endParaRPr>
-          </a:p>
-        </p:txBody>
-      </p:sp>
     </p:spTree>
     <p:extLst>
       <p:ext uri="{BB962C8B-B14F-4D97-AF65-F5344CB8AC3E}">
@@ -7490,8 +7401,8 @@
         </p:blipFill>
         <p:spPr>
           <a:xfrm>
-            <a:off x="8124600" y="2669952"/>
-            <a:ext cx="3229200" cy="3229200"/>
+            <a:off x="7626365" y="1412882"/>
+            <a:ext cx="4032235" cy="4032235"/>
           </a:xfrm>
           <a:prstGeom prst="rect">
             <a:avLst/>
@@ -7512,8 +7423,8 @@
         </p:nvSpPr>
         <p:spPr>
           <a:xfrm>
-            <a:off x="3727435" y="2130789"/>
-            <a:ext cx="4397165" cy="646331"/>
+            <a:off x="3350675" y="1651781"/>
+            <a:ext cx="5490649" cy="646331"/>
           </a:xfrm>
           <a:prstGeom prst="rect">
             <a:avLst/>
@@ -7584,8 +7495,8 @@
         </p:nvSpPr>
         <p:spPr>
           <a:xfrm rot="10800000" flipH="1" flipV="1">
-            <a:off x="3727432" y="2993644"/>
-            <a:ext cx="4205334" cy="483607"/>
+            <a:off x="2986453" y="2433925"/>
+            <a:ext cx="5251113" cy="589291"/>
           </a:xfrm>
           <a:custGeom>
             <a:avLst/>
@@ -7675,8 +7586,8 @@
         </p:nvSpPr>
         <p:spPr>
           <a:xfrm rot="10800000">
-            <a:off x="3727433" y="4284550"/>
-            <a:ext cx="4205333" cy="442891"/>
+            <a:off x="2986454" y="3733728"/>
+            <a:ext cx="5251112" cy="539677"/>
           </a:xfrm>
           <a:custGeom>
             <a:avLst/>
@@ -7766,8 +7677,8 @@
         </p:nvSpPr>
         <p:spPr>
           <a:xfrm>
-            <a:off x="4381139" y="4943965"/>
-            <a:ext cx="3089757" cy="369332"/>
+            <a:off x="4166941" y="4489929"/>
+            <a:ext cx="3858115" cy="369332"/>
           </a:xfrm>
           <a:prstGeom prst="rect">
             <a:avLst/>
@@ -7775,7 +7686,7 @@
           <a:noFill/>
         </p:spPr>
         <p:txBody>
-          <a:bodyPr wrap="none" rtlCol="0">
+          <a:bodyPr wrap="square" rtlCol="0">
             <a:spAutoFit/>
           </a:bodyPr>
           <a:lstStyle/>
@@ -7805,132 +7716,6 @@
               <a:t>solicitados</a:t>
             </a:r>
             <a:endParaRPr lang="en-US" dirty="0"/>
-          </a:p>
-        </p:txBody>
-      </p:sp>
-      <p:sp>
-        <p:nvSpPr>
-          <p:cNvPr id="16" name="Title 1">
-            <a:extLst>
-              <a:ext uri="{FF2B5EF4-FFF2-40B4-BE49-F238E27FC236}">
-                <a16:creationId xmlns:a16="http://schemas.microsoft.com/office/drawing/2014/main" id="{1AD27D8C-92BF-CD44-BF95-7F85AD8809D3}"/>
-              </a:ext>
-            </a:extLst>
-          </p:cNvPr>
-          <p:cNvSpPr txBox="1">
-            <a:spLocks/>
-          </p:cNvSpPr>
-          <p:nvPr/>
-        </p:nvSpPr>
-        <p:spPr>
-          <a:xfrm>
-            <a:off x="838200" y="365125"/>
-            <a:ext cx="10515600" cy="1325563"/>
-          </a:xfrm>
-          <a:prstGeom prst="rect">
-            <a:avLst/>
-          </a:prstGeom>
-        </p:spPr>
-        <p:txBody>
-          <a:bodyPr vert="horz" lIns="91440" tIns="45720" rIns="91440" bIns="45720" rtlCol="0" anchor="ctr">
-            <a:normAutofit/>
-          </a:bodyPr>
-          <a:lstStyle>
-            <a:lvl1pPr algn="l" defTabSz="914400" rtl="0" eaLnBrk="1" latinLnBrk="0" hangingPunct="1">
-              <a:lnSpc>
-                <a:spcPct val="90000"/>
-              </a:lnSpc>
-              <a:spcBef>
-                <a:spcPct val="0"/>
-              </a:spcBef>
-              <a:buNone/>
-              <a:defRPr sz="4400" kern="1200">
-                <a:solidFill>
-                  <a:schemeClr val="tx1"/>
-                </a:solidFill>
-                <a:latin typeface="+mj-lt"/>
-                <a:ea typeface="+mj-ea"/>
-                <a:cs typeface="+mj-cs"/>
-              </a:defRPr>
-            </a:lvl1pPr>
-          </a:lstStyle>
-          <a:p>
-            <a:pPr algn="ctr"/>
-            <a:r>
-              <a:rPr lang="en-US" dirty="0" err="1">
-                <a:ln w="0"/>
-                <a:effectLst>
-                  <a:outerShdw blurRad="38100" dist="19050" dir="2700000" algn="tl" rotWithShape="0">
-                    <a:schemeClr val="dk1">
-                      <a:alpha val="40000"/>
-                    </a:schemeClr>
-                  </a:outerShdw>
-                </a:effectLst>
-              </a:rPr>
-              <a:t>Pesquisa</a:t>
-            </a:r>
-            <a:r>
-              <a:rPr lang="en-US" dirty="0">
-                <a:ln w="0"/>
-                <a:effectLst>
-                  <a:outerShdw blurRad="38100" dist="19050" dir="2700000" algn="tl" rotWithShape="0">
-                    <a:schemeClr val="dk1">
-                      <a:alpha val="40000"/>
-                    </a:schemeClr>
-                  </a:outerShdw>
-                </a:effectLst>
-              </a:rPr>
-              <a:t> </a:t>
-            </a:r>
-            <a:r>
-              <a:rPr lang="en-US" dirty="0" err="1">
-                <a:ln w="0"/>
-                <a:effectLst>
-                  <a:outerShdw blurRad="38100" dist="19050" dir="2700000" algn="tl" rotWithShape="0">
-                    <a:schemeClr val="dk1">
-                      <a:alpha val="40000"/>
-                    </a:schemeClr>
-                  </a:outerShdw>
-                </a:effectLst>
-              </a:rPr>
-              <a:t>personalizada</a:t>
-            </a:r>
-            <a:r>
-              <a:rPr lang="en-US" dirty="0">
-                <a:ln w="0"/>
-                <a:effectLst>
-                  <a:outerShdw blurRad="38100" dist="19050" dir="2700000" algn="tl" rotWithShape="0">
-                    <a:schemeClr val="dk1">
-                      <a:alpha val="40000"/>
-                    </a:schemeClr>
-                  </a:outerShdw>
-                </a:effectLst>
-              </a:rPr>
-              <a:t> de </a:t>
-            </a:r>
-            <a:r>
-              <a:rPr lang="en-US" dirty="0" err="1">
-                <a:ln w="0"/>
-                <a:effectLst>
-                  <a:outerShdw blurRad="38100" dist="19050" dir="2700000" algn="tl" rotWithShape="0">
-                    <a:schemeClr val="dk1">
-                      <a:alpha val="40000"/>
-                    </a:schemeClr>
-                  </a:outerShdw>
-                </a:effectLst>
-              </a:rPr>
-              <a:t>eventos</a:t>
-            </a:r>
-            <a:endParaRPr lang="en-US" dirty="0">
-              <a:ln w="0"/>
-              <a:effectLst>
-                <a:outerShdw blurRad="38100" dist="19050" dir="2700000" algn="tl" rotWithShape="0">
-                  <a:schemeClr val="dk1">
-                    <a:alpha val="40000"/>
-                  </a:schemeClr>
-                </a:outerShdw>
-              </a:effectLst>
-            </a:endParaRPr>
           </a:p>
         </p:txBody>
       </p:sp>
@@ -7962,8 +7747,8 @@
         </p:blipFill>
         <p:spPr>
           <a:xfrm>
-            <a:off x="498235" y="2669952"/>
-            <a:ext cx="3229200" cy="3229200"/>
+            <a:off x="0" y="1412882"/>
+            <a:ext cx="4032235" cy="4032235"/>
           </a:xfrm>
           <a:prstGeom prst="rect">
             <a:avLst/>
@@ -8000,12 +7785,64 @@
           <a:chExt cx="0" cy="0"/>
         </a:xfrm>
       </p:grpSpPr>
+      <p:sp>
+        <p:nvSpPr>
+          <p:cNvPr id="13" name="Title 1">
+            <a:extLst>
+              <a:ext uri="{FF2B5EF4-FFF2-40B4-BE49-F238E27FC236}">
+                <a16:creationId xmlns:a16="http://schemas.microsoft.com/office/drawing/2014/main" id="{51E4819D-23A5-C749-A98B-A55B52CE0488}"/>
+              </a:ext>
+            </a:extLst>
+          </p:cNvPr>
+          <p:cNvSpPr txBox="1">
+            <a:spLocks/>
+          </p:cNvSpPr>
+          <p:nvPr/>
+        </p:nvSpPr>
+        <p:spPr>
+          <a:xfrm>
+            <a:off x="838200" y="365125"/>
+            <a:ext cx="10515600" cy="1325563"/>
+          </a:xfrm>
+          <a:prstGeom prst="rect">
+            <a:avLst/>
+          </a:prstGeom>
+        </p:spPr>
+        <p:txBody>
+          <a:bodyPr vert="horz" lIns="91440" tIns="45720" rIns="91440" bIns="45720" rtlCol="0" anchor="ctr">
+            <a:normAutofit/>
+          </a:bodyPr>
+          <a:lstStyle>
+            <a:lvl1pPr algn="l" defTabSz="914400" rtl="0" eaLnBrk="1" latinLnBrk="0" hangingPunct="1">
+              <a:lnSpc>
+                <a:spcPct val="90000"/>
+              </a:lnSpc>
+              <a:spcBef>
+                <a:spcPct val="0"/>
+              </a:spcBef>
+              <a:buNone/>
+              <a:defRPr sz="4400" kern="1200">
+                <a:solidFill>
+                  <a:schemeClr val="tx1"/>
+                </a:solidFill>
+                <a:latin typeface="+mj-lt"/>
+                <a:ea typeface="+mj-ea"/>
+                <a:cs typeface="+mj-cs"/>
+              </a:defRPr>
+            </a:lvl1pPr>
+          </a:lstStyle>
+          <a:p>
+            <a:pPr algn="ctr"/>
+            <a:endParaRPr lang="en-US" dirty="0"/>
+          </a:p>
+        </p:txBody>
+      </p:sp>
       <p:pic>
         <p:nvPicPr>
-          <p:cNvPr id="32" name="Picture 31">
-            <a:extLst>
-              <a:ext uri="{FF2B5EF4-FFF2-40B4-BE49-F238E27FC236}">
-                <a16:creationId xmlns:a16="http://schemas.microsoft.com/office/drawing/2014/main" id="{660CD6EF-C225-E941-B653-B77FB177AFAD}"/>
+          <p:cNvPr id="16" name="Graphic 15" descr="Smart Phone">
+            <a:extLst>
+              <a:ext uri="{FF2B5EF4-FFF2-40B4-BE49-F238E27FC236}">
+                <a16:creationId xmlns:a16="http://schemas.microsoft.com/office/drawing/2014/main" id="{CBAC7284-29F2-4B44-9106-FEF4E972AB6B}"/>
               </a:ext>
             </a:extLst>
           </p:cNvPr>
@@ -8015,15 +7852,21 @@
           <p:nvPr/>
         </p:nvPicPr>
         <p:blipFill>
-          <a:blip r:embed="rId2"/>
+          <a:blip r:embed="rId2">
+            <a:extLst>
+              <a:ext uri="{96DAC541-7B7A-43D3-8B79-37D633B846F1}">
+                <asvg:svgBlip xmlns:asvg="http://schemas.microsoft.com/office/drawing/2016/SVG/main" r:embed="rId3"/>
+              </a:ext>
+            </a:extLst>
+          </a:blip>
           <a:stretch>
             <a:fillRect/>
           </a:stretch>
         </p:blipFill>
         <p:spPr>
           <a:xfrm>
-            <a:off x="1174450" y="2111670"/>
-            <a:ext cx="3225801" cy="3225801"/>
+            <a:off x="4188908" y="868770"/>
+            <a:ext cx="1718260" cy="1718260"/>
           </a:xfrm>
           <a:prstGeom prst="rect">
             <a:avLst/>
@@ -8032,10 +7875,10 @@
       </p:pic>
       <p:pic>
         <p:nvPicPr>
-          <p:cNvPr id="34" name="Graphic 33" descr="Internet">
-            <a:extLst>
-              <a:ext uri="{FF2B5EF4-FFF2-40B4-BE49-F238E27FC236}">
-                <a16:creationId xmlns:a16="http://schemas.microsoft.com/office/drawing/2014/main" id="{368F60CC-D91F-DB48-B659-69839B4A0624}"/>
+          <p:cNvPr id="17" name="Picture 16">
+            <a:extLst>
+              <a:ext uri="{FF2B5EF4-FFF2-40B4-BE49-F238E27FC236}">
+                <a16:creationId xmlns:a16="http://schemas.microsoft.com/office/drawing/2014/main" id="{940D96BE-484F-8C4B-B3BA-12CBDD2767E0}"/>
               </a:ext>
             </a:extLst>
           </p:cNvPr>
@@ -8045,21 +7888,15 @@
           <p:nvPr/>
         </p:nvPicPr>
         <p:blipFill>
-          <a:blip r:embed="rId3">
-            <a:extLst>
-              <a:ext uri="{96DAC541-7B7A-43D3-8B79-37D633B846F1}">
-                <asvg:svgBlip xmlns:asvg="http://schemas.microsoft.com/office/drawing/2016/SVG/main" r:embed="rId4"/>
-              </a:ext>
-            </a:extLst>
-          </a:blip>
+          <a:blip r:embed="rId4"/>
           <a:stretch>
             <a:fillRect/>
           </a:stretch>
         </p:blipFill>
         <p:spPr>
           <a:xfrm>
-            <a:off x="7791748" y="2133793"/>
-            <a:ext cx="3225801" cy="3225801"/>
+            <a:off x="838200" y="831558"/>
+            <a:ext cx="1718260" cy="1718260"/>
           </a:xfrm>
           <a:prstGeom prst="rect">
             <a:avLst/>
@@ -8068,10 +7905,10 @@
       </p:pic>
       <p:sp>
         <p:nvSpPr>
-          <p:cNvPr id="35" name="Freeform 34">
-            <a:extLst>
-              <a:ext uri="{FF2B5EF4-FFF2-40B4-BE49-F238E27FC236}">
-                <a16:creationId xmlns:a16="http://schemas.microsoft.com/office/drawing/2014/main" id="{041B18FB-E462-224F-852A-DCA20529C207}"/>
+          <p:cNvPr id="18" name="Freeform 17">
+            <a:extLst>
+              <a:ext uri="{FF2B5EF4-FFF2-40B4-BE49-F238E27FC236}">
+                <a16:creationId xmlns:a16="http://schemas.microsoft.com/office/drawing/2014/main" id="{E472D3A4-2081-8F45-9C3F-42921DB32C3D}"/>
               </a:ext>
             </a:extLst>
           </p:cNvPr>
@@ -8079,9 +7916,9 @@
           <p:nvPr/>
         </p:nvSpPr>
         <p:spPr>
-          <a:xfrm rot="10800000" flipV="1">
-            <a:off x="4062364" y="3597164"/>
-            <a:ext cx="3729384" cy="483607"/>
+          <a:xfrm flipV="1">
+            <a:off x="2605381" y="1802745"/>
+            <a:ext cx="1947334" cy="410500"/>
           </a:xfrm>
           <a:custGeom>
             <a:avLst/>
@@ -8159,10 +7996,101 @@
       </p:sp>
       <p:sp>
         <p:nvSpPr>
-          <p:cNvPr id="3" name="TextBox 2">
-            <a:extLst>
-              <a:ext uri="{FF2B5EF4-FFF2-40B4-BE49-F238E27FC236}">
-                <a16:creationId xmlns:a16="http://schemas.microsoft.com/office/drawing/2014/main" id="{DF9DD45D-0285-6F42-AB2D-4A0EFD3644B4}"/>
+          <p:cNvPr id="19" name="Freeform 18">
+            <a:extLst>
+              <a:ext uri="{FF2B5EF4-FFF2-40B4-BE49-F238E27FC236}">
+                <a16:creationId xmlns:a16="http://schemas.microsoft.com/office/drawing/2014/main" id="{F5E70DBE-4FBA-FF4B-9E1D-49EE178BC5C0}"/>
+              </a:ext>
+            </a:extLst>
+          </p:cNvPr>
+          <p:cNvSpPr/>
+          <p:nvPr/>
+        </p:nvSpPr>
+        <p:spPr>
+          <a:xfrm flipH="1">
+            <a:off x="2605379" y="1153638"/>
+            <a:ext cx="1947335" cy="430010"/>
+          </a:xfrm>
+          <a:custGeom>
+            <a:avLst/>
+            <a:gdLst>
+              <a:gd name="connsiteX0" fmla="*/ 0 w 1947334"/>
+              <a:gd name="connsiteY0" fmla="*/ 593574 h 712107"/>
+              <a:gd name="connsiteX1" fmla="*/ 948267 w 1947334"/>
+              <a:gd name="connsiteY1" fmla="*/ 907 h 712107"/>
+              <a:gd name="connsiteX2" fmla="*/ 1947334 w 1947334"/>
+              <a:gd name="connsiteY2" fmla="*/ 712107 h 712107"/>
+            </a:gdLst>
+            <a:ahLst/>
+            <a:cxnLst>
+              <a:cxn ang="0">
+                <a:pos x="connsiteX0" y="connsiteY0"/>
+              </a:cxn>
+              <a:cxn ang="0">
+                <a:pos x="connsiteX1" y="connsiteY1"/>
+              </a:cxn>
+              <a:cxn ang="0">
+                <a:pos x="connsiteX2" y="connsiteY2"/>
+              </a:cxn>
+            </a:cxnLst>
+            <a:rect l="l" t="t" r="r" b="b"/>
+            <a:pathLst>
+              <a:path w="1947334" h="712107">
+                <a:moveTo>
+                  <a:pt x="0" y="593574"/>
+                </a:moveTo>
+                <a:cubicBezTo>
+                  <a:pt x="311855" y="287362"/>
+                  <a:pt x="623711" y="-18849"/>
+                  <a:pt x="948267" y="907"/>
+                </a:cubicBezTo>
+                <a:cubicBezTo>
+                  <a:pt x="1272823" y="20663"/>
+                  <a:pt x="1610078" y="366385"/>
+                  <a:pt x="1947334" y="712107"/>
+                </a:cubicBezTo>
+              </a:path>
+            </a:pathLst>
+          </a:custGeom>
+          <a:ln w="9525" cap="flat" cmpd="sng" algn="ctr">
+            <a:solidFill>
+              <a:schemeClr val="dk1"/>
+            </a:solidFill>
+            <a:prstDash val="solid"/>
+            <a:round/>
+            <a:headEnd type="none" w="med" len="med"/>
+            <a:tailEnd type="arrow" w="med" len="med"/>
+          </a:ln>
+        </p:spPr>
+        <p:style>
+          <a:lnRef idx="0">
+            <a:scrgbClr r="0" g="0" b="0"/>
+          </a:lnRef>
+          <a:fillRef idx="0">
+            <a:scrgbClr r="0" g="0" b="0"/>
+          </a:fillRef>
+          <a:effectRef idx="0">
+            <a:scrgbClr r="0" g="0" b="0"/>
+          </a:effectRef>
+          <a:fontRef idx="minor">
+            <a:schemeClr val="tx1"/>
+          </a:fontRef>
+        </p:style>
+        <p:txBody>
+          <a:bodyPr rtlCol="0" anchor="ctr"/>
+          <a:lstStyle/>
+          <a:p>
+            <a:pPr algn="ctr"/>
+            <a:endParaRPr lang="en-US"/>
+          </a:p>
+        </p:txBody>
+      </p:sp>
+      <p:sp>
+        <p:nvSpPr>
+          <p:cNvPr id="20" name="TextBox 19">
+            <a:extLst>
+              <a:ext uri="{FF2B5EF4-FFF2-40B4-BE49-F238E27FC236}">
+                <a16:creationId xmlns:a16="http://schemas.microsoft.com/office/drawing/2014/main" id="{AF9257BF-4654-CC4B-A51D-966CAEFB3C22}"/>
               </a:ext>
             </a:extLst>
           </p:cNvPr>
@@ -8171,8 +8099,8 @@
         </p:nvSpPr>
         <p:spPr>
           <a:xfrm>
-            <a:off x="4062366" y="2529850"/>
-            <a:ext cx="4067267" cy="646331"/>
+            <a:off x="2697357" y="257312"/>
+            <a:ext cx="2005229" cy="923330"/>
           </a:xfrm>
           <a:prstGeom prst="rect">
             <a:avLst/>
@@ -8180,26 +8108,33 @@
           <a:noFill/>
         </p:spPr>
         <p:txBody>
-          <a:bodyPr wrap="none" rtlCol="0">
+          <a:bodyPr wrap="square" rtlCol="0">
             <a:spAutoFit/>
           </a:bodyPr>
           <a:lstStyle/>
           <a:p>
             <a:r>
               <a:rPr lang="en-US" dirty="0"/>
-              <a:t>1. </a:t>
+              <a:t>2. </a:t>
             </a:r>
             <a:r>
               <a:rPr lang="en-US" dirty="0" err="1"/>
-              <a:t>Fornece</a:t>
+              <a:t>Requisita</a:t>
             </a:r>
             <a:r>
               <a:rPr lang="en-US" dirty="0"/>
-              <a:t> dados </a:t>
+              <a:t> login e </a:t>
+            </a:r>
+          </a:p>
+          <a:p>
+            <a:pPr algn="just"/>
+            <a:r>
+              <a:rPr lang="en-US" dirty="0"/>
+              <a:t>dados da </a:t>
             </a:r>
             <a:r>
               <a:rPr lang="en-US" dirty="0" err="1"/>
-              <a:t>sobre</a:t>
+              <a:t>sugestão</a:t>
             </a:r>
             <a:r>
               <a:rPr lang="en-US" dirty="0"/>
@@ -8207,18 +8142,54 @@
             </a:r>
             <a:r>
               <a:rPr lang="en-US" dirty="0" err="1"/>
-              <a:t>estabelecimentos</a:t>
+              <a:t>turística</a:t>
             </a:r>
             <a:endParaRPr lang="en-US" dirty="0"/>
           </a:p>
+        </p:txBody>
+      </p:sp>
+      <p:sp>
+        <p:nvSpPr>
+          <p:cNvPr id="21" name="TextBox 20">
+            <a:extLst>
+              <a:ext uri="{FF2B5EF4-FFF2-40B4-BE49-F238E27FC236}">
+                <a16:creationId xmlns:a16="http://schemas.microsoft.com/office/drawing/2014/main" id="{374BD6B7-3E0D-BB47-9845-A123EAD28722}"/>
+              </a:ext>
+            </a:extLst>
+          </p:cNvPr>
+          <p:cNvSpPr txBox="1"/>
+          <p:nvPr/>
+        </p:nvSpPr>
+        <p:spPr>
+          <a:xfrm>
+            <a:off x="2639240" y="2258453"/>
+            <a:ext cx="1962397" cy="923330"/>
+          </a:xfrm>
+          <a:prstGeom prst="rect">
+            <a:avLst/>
+          </a:prstGeom>
+          <a:noFill/>
+        </p:spPr>
+        <p:txBody>
+          <a:bodyPr wrap="square" rtlCol="0">
+            <a:spAutoFit/>
+          </a:bodyPr>
+          <a:lstStyle/>
           <a:p>
             <a:r>
               <a:rPr lang="en-US" dirty="0"/>
-              <a:t>e </a:t>
+              <a:t>3. Concede login e </a:t>
+            </a:r>
+          </a:p>
+          <a:p>
+            <a:pPr algn="just"/>
+            <a:r>
+              <a:rPr lang="en-US" dirty="0"/>
+              <a:t>dados da </a:t>
             </a:r>
             <a:r>
               <a:rPr lang="en-US" dirty="0" err="1"/>
-              <a:t>pontos</a:t>
+              <a:t>sugestão</a:t>
             </a:r>
             <a:r>
               <a:rPr lang="en-US" dirty="0"/>
@@ -8226,122 +8197,797 @@
             </a:r>
             <a:r>
               <a:rPr lang="en-US" dirty="0" err="1"/>
-              <a:t>turísticos</a:t>
-            </a:r>
-            <a:r>
-              <a:rPr lang="en-US" dirty="0"/>
-              <a:t> </a:t>
-            </a:r>
-            <a:r>
-              <a:rPr lang="en-US" dirty="0" err="1"/>
-              <a:t>em</a:t>
-            </a:r>
-            <a:r>
-              <a:rPr lang="en-US" dirty="0"/>
-              <a:t> </a:t>
-            </a:r>
-            <a:r>
-              <a:rPr lang="en-US" dirty="0" err="1"/>
-              <a:t>diversas</a:t>
-            </a:r>
-            <a:r>
-              <a:rPr lang="en-US" dirty="0"/>
-              <a:t> </a:t>
-            </a:r>
-            <a:r>
-              <a:rPr lang="en-US" dirty="0" err="1"/>
-              <a:t>cidades</a:t>
+              <a:t>turística</a:t>
             </a:r>
             <a:endParaRPr lang="en-US" dirty="0"/>
           </a:p>
         </p:txBody>
       </p:sp>
-      <p:sp>
-        <p:nvSpPr>
-          <p:cNvPr id="13" name="Title 1">
-            <a:extLst>
-              <a:ext uri="{FF2B5EF4-FFF2-40B4-BE49-F238E27FC236}">
-                <a16:creationId xmlns:a16="http://schemas.microsoft.com/office/drawing/2014/main" id="{51E4819D-23A5-C749-A98B-A55B52CE0488}"/>
-              </a:ext>
-            </a:extLst>
-          </p:cNvPr>
-          <p:cNvSpPr txBox="1">
-            <a:spLocks/>
-          </p:cNvSpPr>
+      <p:pic>
+        <p:nvPicPr>
+          <p:cNvPr id="22" name="Picture 21">
+            <a:extLst>
+              <a:ext uri="{FF2B5EF4-FFF2-40B4-BE49-F238E27FC236}">
+                <a16:creationId xmlns:a16="http://schemas.microsoft.com/office/drawing/2014/main" id="{F2832EE4-477A-A548-8B8C-16C3BBE8F1D6}"/>
+              </a:ext>
+            </a:extLst>
+          </p:cNvPr>
+          <p:cNvPicPr>
+            <a:picLocks noChangeAspect="1"/>
+          </p:cNvPicPr>
           <p:nvPr/>
-        </p:nvSpPr>
+        </p:nvPicPr>
+        <p:blipFill>
+          <a:blip r:embed="rId5"/>
+          <a:stretch>
+            <a:fillRect/>
+          </a:stretch>
+        </p:blipFill>
         <p:spPr>
           <a:xfrm>
-            <a:off x="838200" y="365125"/>
-            <a:ext cx="10515600" cy="1325563"/>
+            <a:off x="8383678" y="468793"/>
+            <a:ext cx="2256549" cy="2224958"/>
           </a:xfrm>
           <a:prstGeom prst="rect">
             <a:avLst/>
           </a:prstGeom>
         </p:spPr>
-        <p:txBody>
-          <a:bodyPr vert="horz" lIns="91440" tIns="45720" rIns="91440" bIns="45720" rtlCol="0" anchor="ctr">
-            <a:normAutofit/>
+      </p:pic>
+      <p:sp>
+        <p:nvSpPr>
+          <p:cNvPr id="23" name="Freeform 22">
+            <a:extLst>
+              <a:ext uri="{FF2B5EF4-FFF2-40B4-BE49-F238E27FC236}">
+                <a16:creationId xmlns:a16="http://schemas.microsoft.com/office/drawing/2014/main" id="{F2BF1C68-DFFA-9446-9B5E-8B6EB39CE583}"/>
+              </a:ext>
+            </a:extLst>
+          </p:cNvPr>
+          <p:cNvSpPr/>
+          <p:nvPr/>
+        </p:nvSpPr>
+        <p:spPr>
+          <a:xfrm>
+            <a:off x="5577378" y="1157939"/>
+            <a:ext cx="2806300" cy="423333"/>
+          </a:xfrm>
+          <a:custGeom>
+            <a:avLst/>
+            <a:gdLst>
+              <a:gd name="connsiteX0" fmla="*/ 0 w 1947334"/>
+              <a:gd name="connsiteY0" fmla="*/ 593574 h 712107"/>
+              <a:gd name="connsiteX1" fmla="*/ 948267 w 1947334"/>
+              <a:gd name="connsiteY1" fmla="*/ 907 h 712107"/>
+              <a:gd name="connsiteX2" fmla="*/ 1947334 w 1947334"/>
+              <a:gd name="connsiteY2" fmla="*/ 712107 h 712107"/>
+            </a:gdLst>
+            <a:ahLst/>
+            <a:cxnLst>
+              <a:cxn ang="0">
+                <a:pos x="connsiteX0" y="connsiteY0"/>
+              </a:cxn>
+              <a:cxn ang="0">
+                <a:pos x="connsiteX1" y="connsiteY1"/>
+              </a:cxn>
+              <a:cxn ang="0">
+                <a:pos x="connsiteX2" y="connsiteY2"/>
+              </a:cxn>
+            </a:cxnLst>
+            <a:rect l="l" t="t" r="r" b="b"/>
+            <a:pathLst>
+              <a:path w="1947334" h="712107">
+                <a:moveTo>
+                  <a:pt x="0" y="593574"/>
+                </a:moveTo>
+                <a:cubicBezTo>
+                  <a:pt x="311855" y="287362"/>
+                  <a:pt x="623711" y="-18849"/>
+                  <a:pt x="948267" y="907"/>
+                </a:cubicBezTo>
+                <a:cubicBezTo>
+                  <a:pt x="1272823" y="20663"/>
+                  <a:pt x="1610078" y="366385"/>
+                  <a:pt x="1947334" y="712107"/>
+                </a:cubicBezTo>
+              </a:path>
+            </a:pathLst>
+          </a:custGeom>
+          <a:ln w="9525" cap="flat" cmpd="sng" algn="ctr">
+            <a:solidFill>
+              <a:schemeClr val="dk1"/>
+            </a:solidFill>
+            <a:prstDash val="solid"/>
+            <a:round/>
+            <a:headEnd type="none" w="med" len="med"/>
+            <a:tailEnd type="arrow" w="med" len="med"/>
+          </a:ln>
+        </p:spPr>
+        <p:style>
+          <a:lnRef idx="0">
+            <a:scrgbClr r="0" g="0" b="0"/>
+          </a:lnRef>
+          <a:fillRef idx="0">
+            <a:scrgbClr r="0" g="0" b="0"/>
+          </a:fillRef>
+          <a:effectRef idx="0">
+            <a:scrgbClr r="0" g="0" b="0"/>
+          </a:effectRef>
+          <a:fontRef idx="minor">
+            <a:schemeClr val="tx1"/>
+          </a:fontRef>
+        </p:style>
+        <p:txBody>
+          <a:bodyPr rtlCol="0" anchor="ctr"/>
+          <a:lstStyle/>
+          <a:p>
+            <a:pPr algn="ctr"/>
+            <a:endParaRPr lang="en-US"/>
+          </a:p>
+        </p:txBody>
+      </p:sp>
+      <p:sp>
+        <p:nvSpPr>
+          <p:cNvPr id="24" name="TextBox 23">
+            <a:extLst>
+              <a:ext uri="{FF2B5EF4-FFF2-40B4-BE49-F238E27FC236}">
+                <a16:creationId xmlns:a16="http://schemas.microsoft.com/office/drawing/2014/main" id="{2C6D2A38-C581-DA46-B058-CE98264906CE}"/>
+              </a:ext>
+            </a:extLst>
+          </p:cNvPr>
+          <p:cNvSpPr txBox="1"/>
+          <p:nvPr/>
+        </p:nvSpPr>
+        <p:spPr>
+          <a:xfrm>
+            <a:off x="5676886" y="439959"/>
+            <a:ext cx="2991973" cy="646331"/>
+          </a:xfrm>
+          <a:prstGeom prst="rect">
+            <a:avLst/>
+          </a:prstGeom>
+          <a:noFill/>
+        </p:spPr>
+        <p:txBody>
+          <a:bodyPr wrap="square" rtlCol="0">
+            <a:spAutoFit/>
           </a:bodyPr>
-          <a:lstStyle>
-            <a:lvl1pPr algn="l" defTabSz="914400" rtl="0" eaLnBrk="1" latinLnBrk="0" hangingPunct="1">
-              <a:lnSpc>
-                <a:spcPct val="90000"/>
-              </a:lnSpc>
-              <a:spcBef>
-                <a:spcPct val="0"/>
-              </a:spcBef>
-              <a:buNone/>
-              <a:defRPr sz="4400" kern="1200">
-                <a:solidFill>
-                  <a:schemeClr val="tx1"/>
-                </a:solidFill>
-                <a:latin typeface="+mj-lt"/>
-                <a:ea typeface="+mj-ea"/>
-                <a:cs typeface="+mj-cs"/>
-              </a:defRPr>
-            </a:lvl1pPr>
-          </a:lstStyle>
+          <a:lstStyle/>
+          <a:p>
+            <a:pPr algn="just"/>
+            <a:r>
+              <a:rPr lang="en-US" dirty="0"/>
+              <a:t>4. </a:t>
+            </a:r>
+            <a:r>
+              <a:rPr lang="en-US" dirty="0" err="1"/>
+              <a:t>Prepara</a:t>
+            </a:r>
+            <a:r>
+              <a:rPr lang="en-US" dirty="0"/>
+              <a:t> </a:t>
+            </a:r>
+            <a:r>
+              <a:rPr lang="en-US" dirty="0" err="1"/>
+              <a:t>os</a:t>
+            </a:r>
+            <a:r>
+              <a:rPr lang="en-US" dirty="0"/>
+              <a:t> dados </a:t>
+            </a:r>
+            <a:r>
+              <a:rPr lang="en-US" dirty="0" err="1"/>
+              <a:t>recebidos</a:t>
+            </a:r>
+            <a:endParaRPr lang="en-US" dirty="0"/>
+          </a:p>
+          <a:p>
+            <a:r>
+              <a:rPr lang="en-US" dirty="0"/>
+              <a:t>e </a:t>
+            </a:r>
+            <a:r>
+              <a:rPr lang="en-US" dirty="0" err="1"/>
+              <a:t>envia</a:t>
+            </a:r>
+            <a:r>
+              <a:rPr lang="en-US" dirty="0"/>
+              <a:t> para o Watson P.I.</a:t>
+            </a:r>
+          </a:p>
+        </p:txBody>
+      </p:sp>
+      <p:sp>
+        <p:nvSpPr>
+          <p:cNvPr id="25" name="Freeform 24">
+            <a:extLst>
+              <a:ext uri="{FF2B5EF4-FFF2-40B4-BE49-F238E27FC236}">
+                <a16:creationId xmlns:a16="http://schemas.microsoft.com/office/drawing/2014/main" id="{B84CA863-1DE3-4646-814E-0C6F9A191EEA}"/>
+              </a:ext>
+            </a:extLst>
+          </p:cNvPr>
+          <p:cNvSpPr/>
+          <p:nvPr/>
+        </p:nvSpPr>
+        <p:spPr>
+          <a:xfrm flipH="1" flipV="1">
+            <a:off x="5577378" y="1808634"/>
+            <a:ext cx="2807448" cy="430010"/>
+          </a:xfrm>
+          <a:custGeom>
+            <a:avLst/>
+            <a:gdLst>
+              <a:gd name="connsiteX0" fmla="*/ 0 w 1947334"/>
+              <a:gd name="connsiteY0" fmla="*/ 593574 h 712107"/>
+              <a:gd name="connsiteX1" fmla="*/ 948267 w 1947334"/>
+              <a:gd name="connsiteY1" fmla="*/ 907 h 712107"/>
+              <a:gd name="connsiteX2" fmla="*/ 1947334 w 1947334"/>
+              <a:gd name="connsiteY2" fmla="*/ 712107 h 712107"/>
+            </a:gdLst>
+            <a:ahLst/>
+            <a:cxnLst>
+              <a:cxn ang="0">
+                <a:pos x="connsiteX0" y="connsiteY0"/>
+              </a:cxn>
+              <a:cxn ang="0">
+                <a:pos x="connsiteX1" y="connsiteY1"/>
+              </a:cxn>
+              <a:cxn ang="0">
+                <a:pos x="connsiteX2" y="connsiteY2"/>
+              </a:cxn>
+            </a:cxnLst>
+            <a:rect l="l" t="t" r="r" b="b"/>
+            <a:pathLst>
+              <a:path w="1947334" h="712107">
+                <a:moveTo>
+                  <a:pt x="0" y="593574"/>
+                </a:moveTo>
+                <a:cubicBezTo>
+                  <a:pt x="311855" y="287362"/>
+                  <a:pt x="623711" y="-18849"/>
+                  <a:pt x="948267" y="907"/>
+                </a:cubicBezTo>
+                <a:cubicBezTo>
+                  <a:pt x="1272823" y="20663"/>
+                  <a:pt x="1610078" y="366385"/>
+                  <a:pt x="1947334" y="712107"/>
+                </a:cubicBezTo>
+              </a:path>
+            </a:pathLst>
+          </a:custGeom>
+          <a:ln w="9525" cap="flat" cmpd="sng" algn="ctr">
+            <a:solidFill>
+              <a:schemeClr val="dk1"/>
+            </a:solidFill>
+            <a:prstDash val="solid"/>
+            <a:round/>
+            <a:headEnd type="none" w="med" len="med"/>
+            <a:tailEnd type="arrow" w="med" len="med"/>
+          </a:ln>
+        </p:spPr>
+        <p:style>
+          <a:lnRef idx="0">
+            <a:scrgbClr r="0" g="0" b="0"/>
+          </a:lnRef>
+          <a:fillRef idx="0">
+            <a:scrgbClr r="0" g="0" b="0"/>
+          </a:fillRef>
+          <a:effectRef idx="0">
+            <a:scrgbClr r="0" g="0" b="0"/>
+          </a:effectRef>
+          <a:fontRef idx="minor">
+            <a:schemeClr val="tx1"/>
+          </a:fontRef>
+        </p:style>
+        <p:txBody>
+          <a:bodyPr rtlCol="0" anchor="ctr"/>
+          <a:lstStyle/>
           <a:p>
             <a:pPr algn="ctr"/>
-            <a:r>
-              <a:rPr lang="en-US" dirty="0" err="1">
-                <a:ln w="0"/>
-                <a:effectLst>
-                  <a:outerShdw blurRad="38100" dist="19050" dir="2700000" algn="tl" rotWithShape="0">
-                    <a:schemeClr val="dk1">
-                      <a:alpha val="40000"/>
-                    </a:schemeClr>
-                  </a:outerShdw>
-                </a:effectLst>
-              </a:rPr>
-              <a:t>Cadastramento</a:t>
-            </a:r>
-            <a:r>
-              <a:rPr lang="en-US" dirty="0">
-                <a:ln w="0"/>
-                <a:effectLst>
-                  <a:outerShdw blurRad="38100" dist="19050" dir="2700000" algn="tl" rotWithShape="0">
-                    <a:schemeClr val="dk1">
-                      <a:alpha val="40000"/>
-                    </a:schemeClr>
-                  </a:outerShdw>
-                </a:effectLst>
-              </a:rPr>
-              <a:t> de </a:t>
-            </a:r>
-            <a:r>
-              <a:rPr lang="en-US" dirty="0" err="1">
-                <a:ln w="0"/>
-                <a:effectLst>
-                  <a:outerShdw blurRad="38100" dist="19050" dir="2700000" algn="tl" rotWithShape="0">
-                    <a:schemeClr val="dk1">
-                      <a:alpha val="40000"/>
-                    </a:schemeClr>
-                  </a:outerShdw>
-                </a:effectLst>
-              </a:rPr>
-              <a:t>eventos</a:t>
+            <a:endParaRPr lang="en-US"/>
+          </a:p>
+        </p:txBody>
+      </p:sp>
+      <p:sp>
+        <p:nvSpPr>
+          <p:cNvPr id="26" name="TextBox 25">
+            <a:extLst>
+              <a:ext uri="{FF2B5EF4-FFF2-40B4-BE49-F238E27FC236}">
+                <a16:creationId xmlns:a16="http://schemas.microsoft.com/office/drawing/2014/main" id="{B8C81BFE-E11D-2544-BF27-C796B338B1A4}"/>
+              </a:ext>
+            </a:extLst>
+          </p:cNvPr>
+          <p:cNvSpPr txBox="1"/>
+          <p:nvPr/>
+        </p:nvSpPr>
+        <p:spPr>
+          <a:xfrm>
+            <a:off x="5801660" y="2246110"/>
+            <a:ext cx="2876172" cy="923330"/>
+          </a:xfrm>
+          <a:prstGeom prst="rect">
+            <a:avLst/>
+          </a:prstGeom>
+          <a:noFill/>
+        </p:spPr>
+        <p:txBody>
+          <a:bodyPr wrap="square" rtlCol="0">
+            <a:spAutoFit/>
+          </a:bodyPr>
+          <a:lstStyle/>
+          <a:p>
+            <a:pPr algn="just"/>
+            <a:r>
+              <a:rPr lang="en-US" dirty="0"/>
+              <a:t>5. Watson </a:t>
+            </a:r>
+            <a:r>
+              <a:rPr lang="en-US" dirty="0" err="1"/>
+              <a:t>traduz</a:t>
+            </a:r>
+            <a:r>
+              <a:rPr lang="en-US" dirty="0"/>
+              <a:t> </a:t>
+            </a:r>
+            <a:r>
+              <a:rPr lang="en-US" dirty="0" err="1"/>
+              <a:t>os</a:t>
+            </a:r>
+            <a:r>
+              <a:rPr lang="en-US" dirty="0"/>
+              <a:t> dados</a:t>
+            </a:r>
+          </a:p>
+          <a:p>
+            <a:pPr algn="just"/>
+            <a:r>
+              <a:rPr lang="en-US" dirty="0" err="1"/>
+              <a:t>recebidos</a:t>
+            </a:r>
+            <a:r>
+              <a:rPr lang="en-US" dirty="0"/>
+              <a:t> </a:t>
+            </a:r>
+            <a:r>
+              <a:rPr lang="en-US" dirty="0" err="1"/>
+              <a:t>em</a:t>
+            </a:r>
+            <a:r>
+              <a:rPr lang="en-US" dirty="0"/>
+              <a:t> </a:t>
+            </a:r>
+            <a:r>
+              <a:rPr lang="en-US" dirty="0" err="1"/>
+              <a:t>indicadores</a:t>
+            </a:r>
+            <a:r>
+              <a:rPr lang="en-US" dirty="0"/>
+              <a:t> de</a:t>
+            </a:r>
+          </a:p>
+          <a:p>
+            <a:pPr algn="just"/>
+            <a:r>
+              <a:rPr lang="en-US" dirty="0" err="1"/>
+              <a:t>personalidade</a:t>
+            </a:r>
+            <a:r>
+              <a:rPr lang="en-US" dirty="0"/>
+              <a:t>.</a:t>
+            </a:r>
+          </a:p>
+        </p:txBody>
+      </p:sp>
+      <p:pic>
+        <p:nvPicPr>
+          <p:cNvPr id="27" name="Picture 26">
+            <a:extLst>
+              <a:ext uri="{FF2B5EF4-FFF2-40B4-BE49-F238E27FC236}">
+                <a16:creationId xmlns:a16="http://schemas.microsoft.com/office/drawing/2014/main" id="{08EC4656-3CE9-7345-A0A4-43E5C7E6B42D}"/>
+              </a:ext>
+            </a:extLst>
+          </p:cNvPr>
+          <p:cNvPicPr>
+            <a:picLocks noChangeAspect="1"/>
+          </p:cNvPicPr>
+          <p:nvPr/>
+        </p:nvPicPr>
+        <p:blipFill>
+          <a:blip r:embed="rId6"/>
+          <a:stretch>
+            <a:fillRect/>
+          </a:stretch>
+        </p:blipFill>
+        <p:spPr>
+          <a:xfrm>
+            <a:off x="6344637" y="3358589"/>
+            <a:ext cx="2286000" cy="2286000"/>
+          </a:xfrm>
+          <a:prstGeom prst="rect">
+            <a:avLst/>
+          </a:prstGeom>
+        </p:spPr>
+      </p:pic>
+      <p:sp>
+        <p:nvSpPr>
+          <p:cNvPr id="28" name="Freeform 27">
+            <a:extLst>
+              <a:ext uri="{FF2B5EF4-FFF2-40B4-BE49-F238E27FC236}">
+                <a16:creationId xmlns:a16="http://schemas.microsoft.com/office/drawing/2014/main" id="{F8F885E7-FDA5-8346-931F-4F485B00FD06}"/>
+              </a:ext>
+            </a:extLst>
+          </p:cNvPr>
+          <p:cNvSpPr/>
+          <p:nvPr/>
+        </p:nvSpPr>
+        <p:spPr>
+          <a:xfrm rot="3201338" flipV="1">
+            <a:off x="4739286" y="3257509"/>
+            <a:ext cx="2134514" cy="635873"/>
+          </a:xfrm>
+          <a:custGeom>
+            <a:avLst/>
+            <a:gdLst>
+              <a:gd name="connsiteX0" fmla="*/ 0 w 1947334"/>
+              <a:gd name="connsiteY0" fmla="*/ 593574 h 712107"/>
+              <a:gd name="connsiteX1" fmla="*/ 948267 w 1947334"/>
+              <a:gd name="connsiteY1" fmla="*/ 907 h 712107"/>
+              <a:gd name="connsiteX2" fmla="*/ 1947334 w 1947334"/>
+              <a:gd name="connsiteY2" fmla="*/ 712107 h 712107"/>
+            </a:gdLst>
+            <a:ahLst/>
+            <a:cxnLst>
+              <a:cxn ang="0">
+                <a:pos x="connsiteX0" y="connsiteY0"/>
+              </a:cxn>
+              <a:cxn ang="0">
+                <a:pos x="connsiteX1" y="connsiteY1"/>
+              </a:cxn>
+              <a:cxn ang="0">
+                <a:pos x="connsiteX2" y="connsiteY2"/>
+              </a:cxn>
+            </a:cxnLst>
+            <a:rect l="l" t="t" r="r" b="b"/>
+            <a:pathLst>
+              <a:path w="1947334" h="712107">
+                <a:moveTo>
+                  <a:pt x="0" y="593574"/>
+                </a:moveTo>
+                <a:cubicBezTo>
+                  <a:pt x="311855" y="287362"/>
+                  <a:pt x="623711" y="-18849"/>
+                  <a:pt x="948267" y="907"/>
+                </a:cubicBezTo>
+                <a:cubicBezTo>
+                  <a:pt x="1272823" y="20663"/>
+                  <a:pt x="1610078" y="366385"/>
+                  <a:pt x="1947334" y="712107"/>
+                </a:cubicBezTo>
+              </a:path>
+            </a:pathLst>
+          </a:custGeom>
+          <a:ln w="9525" cap="flat" cmpd="sng" algn="ctr">
+            <a:solidFill>
+              <a:schemeClr val="dk1"/>
+            </a:solidFill>
+            <a:prstDash val="solid"/>
+            <a:round/>
+            <a:headEnd type="none" w="med" len="med"/>
+            <a:tailEnd type="arrow" w="med" len="med"/>
+          </a:ln>
+        </p:spPr>
+        <p:style>
+          <a:lnRef idx="0">
+            <a:scrgbClr r="0" g="0" b="0"/>
+          </a:lnRef>
+          <a:fillRef idx="0">
+            <a:scrgbClr r="0" g="0" b="0"/>
+          </a:fillRef>
+          <a:effectRef idx="0">
+            <a:scrgbClr r="0" g="0" b="0"/>
+          </a:effectRef>
+          <a:fontRef idx="minor">
+            <a:schemeClr val="tx1"/>
+          </a:fontRef>
+        </p:style>
+        <p:txBody>
+          <a:bodyPr rtlCol="0" anchor="ctr"/>
+          <a:lstStyle/>
+          <a:p>
+            <a:pPr algn="ctr"/>
+            <a:endParaRPr lang="en-US"/>
+          </a:p>
+        </p:txBody>
+      </p:sp>
+      <p:sp>
+        <p:nvSpPr>
+          <p:cNvPr id="29" name="TextBox 28">
+            <a:extLst>
+              <a:ext uri="{FF2B5EF4-FFF2-40B4-BE49-F238E27FC236}">
+                <a16:creationId xmlns:a16="http://schemas.microsoft.com/office/drawing/2014/main" id="{EE01EB71-A5D6-734E-8573-CFFDC3E2413B}"/>
+              </a:ext>
+            </a:extLst>
+          </p:cNvPr>
+          <p:cNvSpPr txBox="1"/>
+          <p:nvPr/>
+        </p:nvSpPr>
+        <p:spPr>
+          <a:xfrm>
+            <a:off x="4188908" y="4246155"/>
+            <a:ext cx="2490593" cy="923330"/>
+          </a:xfrm>
+          <a:prstGeom prst="rect">
+            <a:avLst/>
+          </a:prstGeom>
+          <a:noFill/>
+        </p:spPr>
+        <p:txBody>
+          <a:bodyPr wrap="square" rtlCol="0">
+            <a:spAutoFit/>
+          </a:bodyPr>
+          <a:lstStyle/>
+          <a:p>
+            <a:pPr algn="just"/>
+            <a:r>
+              <a:rPr lang="en-US" dirty="0"/>
+              <a:t>6. </a:t>
+            </a:r>
+            <a:r>
+              <a:rPr lang="en-US" dirty="0" err="1"/>
+              <a:t>Os</a:t>
+            </a:r>
+            <a:r>
+              <a:rPr lang="en-US" dirty="0"/>
+              <a:t> dados da </a:t>
+            </a:r>
+            <a:r>
+              <a:rPr lang="en-US" dirty="0" err="1"/>
+              <a:t>sugestão</a:t>
+            </a:r>
+            <a:endParaRPr lang="en-US" dirty="0"/>
+          </a:p>
+          <a:p>
+            <a:pPr algn="just"/>
+            <a:r>
+              <a:rPr lang="en-US" dirty="0"/>
+              <a:t> </a:t>
+            </a:r>
+            <a:r>
+              <a:rPr lang="en-US" dirty="0" err="1"/>
+              <a:t>turística</a:t>
+            </a:r>
+            <a:r>
+              <a:rPr lang="en-US" dirty="0"/>
+              <a:t> </a:t>
+            </a:r>
+            <a:r>
+              <a:rPr lang="en-US" dirty="0" err="1"/>
+              <a:t>são</a:t>
+            </a:r>
+            <a:r>
+              <a:rPr lang="en-US" dirty="0"/>
+              <a:t> salvos no Firebase.</a:t>
+            </a:r>
+          </a:p>
+        </p:txBody>
+      </p:sp>
+      <p:pic>
+        <p:nvPicPr>
+          <p:cNvPr id="9" name="Graphic 8" descr="User">
+            <a:extLst>
+              <a:ext uri="{FF2B5EF4-FFF2-40B4-BE49-F238E27FC236}">
+                <a16:creationId xmlns:a16="http://schemas.microsoft.com/office/drawing/2014/main" id="{D54B26F6-2DB9-A745-85EE-0E5896764643}"/>
+              </a:ext>
+            </a:extLst>
+          </p:cNvPr>
+          <p:cNvPicPr>
+            <a:picLocks noChangeAspect="1"/>
+          </p:cNvPicPr>
+          <p:nvPr/>
+        </p:nvPicPr>
+        <p:blipFill>
+          <a:blip r:embed="rId7">
+            <a:extLst>
+              <a:ext uri="{96DAC541-7B7A-43D3-8B79-37D633B846F1}">
+                <asvg:svgBlip xmlns:asvg="http://schemas.microsoft.com/office/drawing/2016/SVG/main" r:embed="rId8"/>
+              </a:ext>
+            </a:extLst>
+          </a:blip>
+          <a:stretch>
+            <a:fillRect/>
+          </a:stretch>
+        </p:blipFill>
+        <p:spPr>
+          <a:xfrm>
+            <a:off x="1215578" y="4434326"/>
+            <a:ext cx="2258240" cy="2258240"/>
+          </a:xfrm>
+          <a:prstGeom prst="rect">
+            <a:avLst/>
+          </a:prstGeom>
+        </p:spPr>
+      </p:pic>
+      <p:sp>
+        <p:nvSpPr>
+          <p:cNvPr id="31" name="Freeform 30">
+            <a:extLst>
+              <a:ext uri="{FF2B5EF4-FFF2-40B4-BE49-F238E27FC236}">
+                <a16:creationId xmlns:a16="http://schemas.microsoft.com/office/drawing/2014/main" id="{93C4EB19-B2AB-6942-89E5-69831B85D778}"/>
+              </a:ext>
+            </a:extLst>
+          </p:cNvPr>
+          <p:cNvSpPr/>
+          <p:nvPr/>
+        </p:nvSpPr>
+        <p:spPr>
+          <a:xfrm rot="3985762" flipH="1" flipV="1">
+            <a:off x="-305431" y="3748777"/>
+            <a:ext cx="2762287" cy="899934"/>
+          </a:xfrm>
+          <a:custGeom>
+            <a:avLst/>
+            <a:gdLst>
+              <a:gd name="connsiteX0" fmla="*/ 0 w 1947334"/>
+              <a:gd name="connsiteY0" fmla="*/ 593574 h 712107"/>
+              <a:gd name="connsiteX1" fmla="*/ 948267 w 1947334"/>
+              <a:gd name="connsiteY1" fmla="*/ 907 h 712107"/>
+              <a:gd name="connsiteX2" fmla="*/ 1947334 w 1947334"/>
+              <a:gd name="connsiteY2" fmla="*/ 712107 h 712107"/>
+            </a:gdLst>
+            <a:ahLst/>
+            <a:cxnLst>
+              <a:cxn ang="0">
+                <a:pos x="connsiteX0" y="connsiteY0"/>
+              </a:cxn>
+              <a:cxn ang="0">
+                <a:pos x="connsiteX1" y="connsiteY1"/>
+              </a:cxn>
+              <a:cxn ang="0">
+                <a:pos x="connsiteX2" y="connsiteY2"/>
+              </a:cxn>
+            </a:cxnLst>
+            <a:rect l="l" t="t" r="r" b="b"/>
+            <a:pathLst>
+              <a:path w="1947334" h="712107">
+                <a:moveTo>
+                  <a:pt x="0" y="593574"/>
+                </a:moveTo>
+                <a:cubicBezTo>
+                  <a:pt x="311855" y="287362"/>
+                  <a:pt x="623711" y="-18849"/>
+                  <a:pt x="948267" y="907"/>
+                </a:cubicBezTo>
+                <a:cubicBezTo>
+                  <a:pt x="1272823" y="20663"/>
+                  <a:pt x="1610078" y="366385"/>
+                  <a:pt x="1947334" y="712107"/>
+                </a:cubicBezTo>
+              </a:path>
+            </a:pathLst>
+          </a:custGeom>
+          <a:ln w="9525" cap="flat" cmpd="sng" algn="ctr">
+            <a:solidFill>
+              <a:schemeClr val="dk1"/>
+            </a:solidFill>
+            <a:prstDash val="solid"/>
+            <a:round/>
+            <a:headEnd type="none" w="med" len="med"/>
+            <a:tailEnd type="arrow" w="med" len="med"/>
+          </a:ln>
+        </p:spPr>
+        <p:style>
+          <a:lnRef idx="0">
+            <a:scrgbClr r="0" g="0" b="0"/>
+          </a:lnRef>
+          <a:fillRef idx="0">
+            <a:scrgbClr r="0" g="0" b="0"/>
+          </a:fillRef>
+          <a:effectRef idx="0">
+            <a:scrgbClr r="0" g="0" b="0"/>
+          </a:effectRef>
+          <a:fontRef idx="minor">
+            <a:schemeClr val="tx1"/>
+          </a:fontRef>
+        </p:style>
+        <p:txBody>
+          <a:bodyPr rtlCol="0" anchor="ctr"/>
+          <a:lstStyle/>
+          <a:p>
+            <a:pPr algn="ctr"/>
+            <a:endParaRPr lang="en-US"/>
+          </a:p>
+        </p:txBody>
+      </p:sp>
+      <p:sp>
+        <p:nvSpPr>
+          <p:cNvPr id="33" name="TextBox 32">
+            <a:extLst>
+              <a:ext uri="{FF2B5EF4-FFF2-40B4-BE49-F238E27FC236}">
+                <a16:creationId xmlns:a16="http://schemas.microsoft.com/office/drawing/2014/main" id="{4EC6AA00-D5D4-FB49-95B1-E6A929F9E1D2}"/>
+              </a:ext>
+            </a:extLst>
+          </p:cNvPr>
+          <p:cNvSpPr txBox="1"/>
+          <p:nvPr/>
+        </p:nvSpPr>
+        <p:spPr>
+          <a:xfrm>
+            <a:off x="884587" y="3497588"/>
+            <a:ext cx="2869993" cy="1200329"/>
+          </a:xfrm>
+          <a:prstGeom prst="rect">
+            <a:avLst/>
+          </a:prstGeom>
+          <a:noFill/>
+        </p:spPr>
+        <p:txBody>
+          <a:bodyPr wrap="square" rtlCol="0">
+            <a:spAutoFit/>
+          </a:bodyPr>
+          <a:lstStyle/>
+          <a:p>
+            <a:pPr algn="just"/>
+            <a:r>
+              <a:rPr lang="en-US" dirty="0"/>
+              <a:t>1. O </a:t>
+            </a:r>
+            <a:r>
+              <a:rPr lang="en-US" dirty="0" err="1"/>
+              <a:t>desenvolvedor</a:t>
+            </a:r>
+            <a:r>
+              <a:rPr lang="en-US" dirty="0"/>
+              <a:t> </a:t>
+            </a:r>
+            <a:r>
+              <a:rPr lang="en-US" dirty="0" err="1"/>
+              <a:t>cria</a:t>
+            </a:r>
+            <a:r>
+              <a:rPr lang="en-US" dirty="0"/>
+              <a:t> </a:t>
+            </a:r>
+            <a:r>
+              <a:rPr lang="en-US" dirty="0" err="1"/>
+              <a:t>postagens</a:t>
+            </a:r>
+            <a:r>
+              <a:rPr lang="en-US" dirty="0"/>
+              <a:t> no Facebook com </a:t>
+            </a:r>
+            <a:r>
+              <a:rPr lang="en-US" dirty="0" err="1"/>
+              <a:t>críticas</a:t>
+            </a:r>
+            <a:r>
+              <a:rPr lang="en-US" dirty="0"/>
+              <a:t> e </a:t>
+            </a:r>
+            <a:r>
+              <a:rPr lang="en-US" dirty="0" err="1"/>
+              <a:t>análises</a:t>
+            </a:r>
+            <a:r>
+              <a:rPr lang="en-US" dirty="0"/>
+              <a:t> </a:t>
+            </a:r>
+            <a:r>
+              <a:rPr lang="en-US" dirty="0" err="1"/>
+              <a:t>positivas</a:t>
+            </a:r>
+            <a:r>
+              <a:rPr lang="en-US" dirty="0"/>
+              <a:t> da </a:t>
+            </a:r>
+            <a:r>
+              <a:rPr lang="en-US" dirty="0" err="1"/>
+              <a:t>sugestão</a:t>
+            </a:r>
+            <a:r>
+              <a:rPr lang="en-US" dirty="0"/>
+              <a:t> </a:t>
+            </a:r>
+            <a:r>
+              <a:rPr lang="en-US" dirty="0" err="1"/>
+              <a:t>turística</a:t>
             </a:r>
             <a:endParaRPr lang="en-US" dirty="0"/>
           </a:p>
@@ -8399,10 +9045,10 @@
           <a:lstStyle/>
           <a:p>
             <a:r>
-              <a:rPr lang="en-US" dirty="0" err="1"/>
+              <a:rPr lang="en-US" err="1"/>
               <a:t>Tecnologias</a:t>
             </a:r>
-            <a:endParaRPr lang="en-US" dirty="0"/>
+            <a:endParaRPr lang="en-US"/>
           </a:p>
         </p:txBody>
       </p:sp>
@@ -8433,30 +9079,30 @@
           <a:lstStyle/>
           <a:p>
             <a:r>
-              <a:rPr lang="en-US" dirty="0" err="1"/>
+              <a:rPr lang="en-US" err="1"/>
               <a:t>Computação</a:t>
             </a:r>
             <a:r>
-              <a:rPr lang="en-US" dirty="0"/>
+              <a:rPr lang="en-US"/>
               <a:t> </a:t>
             </a:r>
             <a:r>
-              <a:rPr lang="en-US" dirty="0" err="1"/>
+              <a:rPr lang="en-US" err="1"/>
               <a:t>Cognitiva</a:t>
             </a:r>
-            <a:endParaRPr lang="en-US" dirty="0"/>
+            <a:endParaRPr lang="en-US"/>
           </a:p>
           <a:p>
             <a:pPr lvl="1"/>
             <a:r>
-              <a:rPr lang="en-US" dirty="0"/>
+              <a:rPr lang="en-US"/>
               <a:t>Watson Language Translation</a:t>
             </a:r>
           </a:p>
           <a:p>
             <a:pPr lvl="1"/>
             <a:r>
-              <a:rPr lang="en-US" dirty="0"/>
+              <a:rPr lang="en-US"/>
               <a:t>Watson Personality Insights</a:t>
             </a:r>
           </a:p>
@@ -8728,7 +9374,7 @@
           <a:p>
             <a:pPr algn="ctr"/>
             <a:r>
-              <a:rPr lang="en-US" dirty="0"/>
+              <a:rPr lang="en-US"/>
               <a:t>COMPUTAÇÃO COGNITIVA</a:t>
             </a:r>
           </a:p>
@@ -8850,18 +9496,18 @@
           <a:lstStyle/>
           <a:p>
             <a:r>
-              <a:rPr lang="en-US" dirty="0" err="1"/>
+              <a:rPr lang="en-US" err="1"/>
               <a:t>Sistemas</a:t>
             </a:r>
             <a:r>
-              <a:rPr lang="en-US" dirty="0"/>
+              <a:rPr lang="en-US"/>
               <a:t> de </a:t>
             </a:r>
             <a:r>
-              <a:rPr lang="en-US" dirty="0" err="1"/>
+              <a:rPr lang="en-US" err="1"/>
               <a:t>recomendações</a:t>
             </a:r>
-            <a:endParaRPr lang="en-US" dirty="0"/>
+            <a:endParaRPr lang="en-US"/>
           </a:p>
         </p:txBody>
       </p:sp>
@@ -8889,134 +9535,134 @@
           <a:lstStyle/>
           <a:p>
             <a:r>
-              <a:rPr lang="en-US" dirty="0" err="1"/>
+              <a:rPr lang="en-US" err="1"/>
               <a:t>Ao</a:t>
             </a:r>
             <a:r>
-              <a:rPr lang="en-US" dirty="0"/>
+              <a:rPr lang="en-US"/>
               <a:t> </a:t>
             </a:r>
             <a:r>
-              <a:rPr lang="en-US" dirty="0" err="1"/>
+              <a:rPr lang="en-US" err="1"/>
               <a:t>realizar</a:t>
             </a:r>
             <a:r>
-              <a:rPr lang="en-US" dirty="0"/>
+              <a:rPr lang="en-US"/>
               <a:t> o login no Facebook, o </a:t>
             </a:r>
             <a:r>
-              <a:rPr lang="en-US" dirty="0" err="1"/>
+              <a:rPr lang="en-US" err="1"/>
               <a:t>aplicativo</a:t>
             </a:r>
             <a:r>
-              <a:rPr lang="en-US" dirty="0"/>
+              <a:rPr lang="en-US"/>
               <a:t> </a:t>
             </a:r>
             <a:r>
-              <a:rPr lang="en-US" dirty="0" err="1"/>
+              <a:rPr lang="en-US" err="1"/>
               <a:t>acessa</a:t>
             </a:r>
             <a:r>
-              <a:rPr lang="en-US" dirty="0"/>
+              <a:rPr lang="en-US"/>
               <a:t> as </a:t>
             </a:r>
             <a:r>
-              <a:rPr lang="en-US" dirty="0" err="1"/>
+              <a:rPr lang="en-US" err="1"/>
               <a:t>postagens</a:t>
             </a:r>
             <a:r>
-              <a:rPr lang="en-US" dirty="0"/>
+              <a:rPr lang="en-US"/>
               <a:t> do </a:t>
             </a:r>
             <a:r>
-              <a:rPr lang="en-US" dirty="0" err="1"/>
+              <a:rPr lang="en-US" err="1"/>
               <a:t>usuário</a:t>
             </a:r>
             <a:r>
-              <a:rPr lang="en-US" dirty="0"/>
+              <a:rPr lang="en-US"/>
               <a:t>, as </a:t>
             </a:r>
             <a:r>
-              <a:rPr lang="en-US" dirty="0" err="1"/>
+              <a:rPr lang="en-US" err="1"/>
               <a:t>traduz</a:t>
             </a:r>
             <a:r>
-              <a:rPr lang="en-US" dirty="0"/>
+              <a:rPr lang="en-US"/>
               <a:t> e </a:t>
             </a:r>
             <a:r>
-              <a:rPr lang="en-US" dirty="0" err="1"/>
+              <a:rPr lang="en-US" err="1"/>
               <a:t>envia</a:t>
             </a:r>
             <a:r>
-              <a:rPr lang="en-US" dirty="0"/>
+              <a:rPr lang="en-US"/>
               <a:t> para um </a:t>
             </a:r>
             <a:r>
-              <a:rPr lang="en-US" dirty="0" err="1"/>
+              <a:rPr lang="en-US" err="1"/>
               <a:t>objeto</a:t>
             </a:r>
             <a:r>
-              <a:rPr lang="en-US" dirty="0"/>
+              <a:rPr lang="en-US"/>
               <a:t> JSON.</a:t>
             </a:r>
           </a:p>
           <a:p>
             <a:r>
-              <a:rPr lang="en-US" dirty="0"/>
+              <a:rPr lang="en-US"/>
               <a:t>O JSON </a:t>
             </a:r>
             <a:r>
-              <a:rPr lang="en-US" dirty="0" err="1"/>
+              <a:rPr lang="en-US" err="1"/>
               <a:t>é</a:t>
             </a:r>
             <a:r>
-              <a:rPr lang="en-US" dirty="0"/>
+              <a:rPr lang="en-US"/>
               <a:t> </a:t>
             </a:r>
             <a:r>
-              <a:rPr lang="en-US" dirty="0" err="1"/>
+              <a:rPr lang="en-US" err="1"/>
               <a:t>interpretado</a:t>
             </a:r>
             <a:r>
-              <a:rPr lang="en-US" dirty="0"/>
+              <a:rPr lang="en-US"/>
               <a:t> </a:t>
             </a:r>
             <a:r>
-              <a:rPr lang="en-US" dirty="0" err="1"/>
+              <a:rPr lang="en-US" err="1"/>
               <a:t>pelo</a:t>
             </a:r>
             <a:r>
-              <a:rPr lang="en-US" dirty="0"/>
+              <a:rPr lang="en-US"/>
               <a:t> Watson Personality Insights, o que </a:t>
             </a:r>
             <a:r>
-              <a:rPr lang="en-US" dirty="0" err="1"/>
+              <a:rPr lang="en-US" err="1"/>
               <a:t>gera</a:t>
             </a:r>
             <a:r>
-              <a:rPr lang="en-US" dirty="0"/>
+              <a:rPr lang="en-US"/>
               <a:t> o </a:t>
             </a:r>
             <a:r>
-              <a:rPr lang="en-US" dirty="0" err="1"/>
+              <a:rPr lang="en-US" err="1"/>
               <a:t>perfil</a:t>
             </a:r>
             <a:r>
-              <a:rPr lang="en-US" dirty="0"/>
+              <a:rPr lang="en-US"/>
               <a:t> do </a:t>
             </a:r>
             <a:r>
-              <a:rPr lang="en-US" dirty="0" err="1"/>
+              <a:rPr lang="en-US" err="1"/>
               <a:t>usuário</a:t>
             </a:r>
             <a:r>
-              <a:rPr lang="en-US" dirty="0"/>
+              <a:rPr lang="en-US"/>
               <a:t>.</a:t>
             </a:r>
           </a:p>
           <a:p>
-            <a:endParaRPr lang="en-US" dirty="0"/>
+            <a:endParaRPr lang="en-US"/>
           </a:p>
         </p:txBody>
       </p:sp>

</xml_diff>

<commit_message>
change firebase suggestion structure
</commit_message>
<xml_diff>
--- a/Documentação/Apresentacao.pptx
+++ b/Documentação/Apresentacao.pptx
@@ -20,10 +20,11 @@
     <p:sldId id="257" r:id="rId14"/>
     <p:sldId id="260" r:id="rId15"/>
     <p:sldId id="263" r:id="rId16"/>
-    <p:sldId id="270" r:id="rId17"/>
-    <p:sldId id="267" r:id="rId18"/>
-    <p:sldId id="256" r:id="rId19"/>
-    <p:sldId id="261" r:id="rId20"/>
+    <p:sldId id="276" r:id="rId17"/>
+    <p:sldId id="270" r:id="rId18"/>
+    <p:sldId id="267" r:id="rId19"/>
+    <p:sldId id="256" r:id="rId20"/>
+    <p:sldId id="261" r:id="rId21"/>
   </p:sldIdLst>
   <p:sldSz cx="12192000" cy="6858000"/>
   <p:notesSz cx="6858000" cy="9144000"/>
@@ -277,7 +278,7 @@
           <a:p>
             <a:fld id="{6099EA04-CD08-2640-B563-989C2ACFFEE4}" type="datetimeFigureOut">
               <a:rPr lang="en-US" smtClean="0"/>
-              <a:t>5/3/19</a:t>
+              <a:t>5/30/19</a:t>
             </a:fld>
             <a:endParaRPr lang="en-US"/>
           </a:p>
@@ -475,7 +476,7 @@
           <a:p>
             <a:fld id="{6099EA04-CD08-2640-B563-989C2ACFFEE4}" type="datetimeFigureOut">
               <a:rPr lang="en-US" smtClean="0"/>
-              <a:t>5/3/19</a:t>
+              <a:t>5/30/19</a:t>
             </a:fld>
             <a:endParaRPr lang="en-US"/>
           </a:p>
@@ -683,7 +684,7 @@
           <a:p>
             <a:fld id="{6099EA04-CD08-2640-B563-989C2ACFFEE4}" type="datetimeFigureOut">
               <a:rPr lang="en-US" smtClean="0"/>
-              <a:t>5/3/19</a:t>
+              <a:t>5/30/19</a:t>
             </a:fld>
             <a:endParaRPr lang="en-US"/>
           </a:p>
@@ -881,7 +882,7 @@
           <a:p>
             <a:fld id="{6099EA04-CD08-2640-B563-989C2ACFFEE4}" type="datetimeFigureOut">
               <a:rPr lang="en-US" smtClean="0"/>
-              <a:t>5/3/19</a:t>
+              <a:t>5/30/19</a:t>
             </a:fld>
             <a:endParaRPr lang="en-US"/>
           </a:p>
@@ -1156,7 +1157,7 @@
           <a:p>
             <a:fld id="{6099EA04-CD08-2640-B563-989C2ACFFEE4}" type="datetimeFigureOut">
               <a:rPr lang="en-US" smtClean="0"/>
-              <a:t>5/3/19</a:t>
+              <a:t>5/30/19</a:t>
             </a:fld>
             <a:endParaRPr lang="en-US"/>
           </a:p>
@@ -1421,7 +1422,7 @@
           <a:p>
             <a:fld id="{6099EA04-CD08-2640-B563-989C2ACFFEE4}" type="datetimeFigureOut">
               <a:rPr lang="en-US" smtClean="0"/>
-              <a:t>5/3/19</a:t>
+              <a:t>5/30/19</a:t>
             </a:fld>
             <a:endParaRPr lang="en-US"/>
           </a:p>
@@ -1833,7 +1834,7 @@
           <a:p>
             <a:fld id="{6099EA04-CD08-2640-B563-989C2ACFFEE4}" type="datetimeFigureOut">
               <a:rPr lang="en-US" smtClean="0"/>
-              <a:t>5/3/19</a:t>
+              <a:t>5/30/19</a:t>
             </a:fld>
             <a:endParaRPr lang="en-US"/>
           </a:p>
@@ -1974,7 +1975,7 @@
           <a:p>
             <a:fld id="{6099EA04-CD08-2640-B563-989C2ACFFEE4}" type="datetimeFigureOut">
               <a:rPr lang="en-US" smtClean="0"/>
-              <a:t>5/3/19</a:t>
+              <a:t>5/30/19</a:t>
             </a:fld>
             <a:endParaRPr lang="en-US"/>
           </a:p>
@@ -2087,7 +2088,7 @@
           <a:p>
             <a:fld id="{6099EA04-CD08-2640-B563-989C2ACFFEE4}" type="datetimeFigureOut">
               <a:rPr lang="en-US" smtClean="0"/>
-              <a:t>5/3/19</a:t>
+              <a:t>5/30/19</a:t>
             </a:fld>
             <a:endParaRPr lang="en-US"/>
           </a:p>
@@ -2398,7 +2399,7 @@
           <a:p>
             <a:fld id="{6099EA04-CD08-2640-B563-989C2ACFFEE4}" type="datetimeFigureOut">
               <a:rPr lang="en-US" smtClean="0"/>
-              <a:t>5/3/19</a:t>
+              <a:t>5/30/19</a:t>
             </a:fld>
             <a:endParaRPr lang="en-US"/>
           </a:p>
@@ -2686,7 +2687,7 @@
           <a:p>
             <a:fld id="{6099EA04-CD08-2640-B563-989C2ACFFEE4}" type="datetimeFigureOut">
               <a:rPr lang="en-US" smtClean="0"/>
-              <a:t>5/3/19</a:t>
+              <a:t>5/30/19</a:t>
             </a:fld>
             <a:endParaRPr lang="en-US"/>
           </a:p>
@@ -2927,7 +2928,7 @@
           <a:p>
             <a:fld id="{6099EA04-CD08-2640-B563-989C2ACFFEE4}" type="datetimeFigureOut">
               <a:rPr lang="en-US" smtClean="0"/>
-              <a:t>5/3/19</a:t>
+              <a:t>5/30/19</a:t>
             </a:fld>
             <a:endParaRPr lang="en-US"/>
           </a:p>
@@ -5769,42 +5770,894 @@
       </p:grpSpPr>
       <p:sp>
         <p:nvSpPr>
-          <p:cNvPr id="2" name="Title 1">
-            <a:extLst>
-              <a:ext uri="{FF2B5EF4-FFF2-40B4-BE49-F238E27FC236}">
-                <a16:creationId xmlns:a16="http://schemas.microsoft.com/office/drawing/2014/main" id="{56EF0102-41B7-7143-8BF7-A597F4171D68}"/>
-              </a:ext>
-            </a:extLst>
-          </p:cNvPr>
-          <p:cNvSpPr>
-            <a:spLocks noGrp="1"/>
-          </p:cNvSpPr>
-          <p:nvPr>
-            <p:ph type="title"/>
-          </p:nvPr>
+          <p:cNvPr id="4" name="Rounded Rectangle 3">
+            <a:extLst>
+              <a:ext uri="{FF2B5EF4-FFF2-40B4-BE49-F238E27FC236}">
+                <a16:creationId xmlns:a16="http://schemas.microsoft.com/office/drawing/2014/main" id="{959C331B-E174-254C-BC8B-BC9E4212C56D}"/>
+              </a:ext>
+            </a:extLst>
+          </p:cNvPr>
+          <p:cNvSpPr/>
+          <p:nvPr/>
         </p:nvSpPr>
         <p:spPr>
           <a:xfrm>
-            <a:off x="838200" y="2766218"/>
-            <a:ext cx="10515600" cy="1325563"/>
+            <a:off x="2492477" y="914400"/>
+            <a:ext cx="6887497" cy="1120877"/>
           </a:xfrm>
+          <a:prstGeom prst="roundRect">
+            <a:avLst/>
+          </a:prstGeom>
         </p:spPr>
-        <p:txBody>
-          <a:bodyPr/>
+        <p:style>
+          <a:lnRef idx="2">
+            <a:schemeClr val="accent1">
+              <a:shade val="50000"/>
+            </a:schemeClr>
+          </a:lnRef>
+          <a:fillRef idx="1">
+            <a:schemeClr val="accent1"/>
+          </a:fillRef>
+          <a:effectRef idx="0">
+            <a:schemeClr val="accent1"/>
+          </a:effectRef>
+          <a:fontRef idx="minor">
+            <a:schemeClr val="lt1"/>
+          </a:fontRef>
+        </p:style>
+        <p:txBody>
+          <a:bodyPr rtlCol="0" anchor="ctr"/>
           <a:lstStyle/>
           <a:p>
             <a:pPr algn="ctr"/>
             <a:r>
-              <a:rPr lang="en-US"/>
-              <a:t>TESTES</a:t>
-            </a:r>
-          </a:p>
-        </p:txBody>
-      </p:sp>
+              <a:rPr lang="en-US" dirty="0"/>
+              <a:t>70%</a:t>
+            </a:r>
+          </a:p>
+        </p:txBody>
+      </p:sp>
+      <p:sp>
+        <p:nvSpPr>
+          <p:cNvPr id="5" name="Rounded Rectangle 4">
+            <a:extLst>
+              <a:ext uri="{FF2B5EF4-FFF2-40B4-BE49-F238E27FC236}">
+                <a16:creationId xmlns:a16="http://schemas.microsoft.com/office/drawing/2014/main" id="{D5288BF3-A9E3-C84D-BD5A-D65A6034D623}"/>
+              </a:ext>
+            </a:extLst>
+          </p:cNvPr>
+          <p:cNvSpPr/>
+          <p:nvPr/>
+        </p:nvSpPr>
+        <p:spPr>
+          <a:xfrm>
+            <a:off x="2492477" y="2482645"/>
+            <a:ext cx="6887497" cy="1120877"/>
+          </a:xfrm>
+          <a:prstGeom prst="roundRect">
+            <a:avLst/>
+          </a:prstGeom>
+        </p:spPr>
+        <p:style>
+          <a:lnRef idx="2">
+            <a:schemeClr val="accent1">
+              <a:shade val="50000"/>
+            </a:schemeClr>
+          </a:lnRef>
+          <a:fillRef idx="1">
+            <a:schemeClr val="accent1"/>
+          </a:fillRef>
+          <a:effectRef idx="0">
+            <a:schemeClr val="accent1"/>
+          </a:effectRef>
+          <a:fontRef idx="minor">
+            <a:schemeClr val="lt1"/>
+          </a:fontRef>
+        </p:style>
+        <p:txBody>
+          <a:bodyPr rtlCol="0" anchor="ctr"/>
+          <a:lstStyle/>
+          <a:p>
+            <a:pPr algn="r"/>
+            <a:r>
+              <a:rPr lang="en-US" dirty="0"/>
+              <a:t>20%	</a:t>
+            </a:r>
+          </a:p>
+        </p:txBody>
+      </p:sp>
+      <p:sp>
+        <p:nvSpPr>
+          <p:cNvPr id="6" name="Rounded Rectangle 5">
+            <a:extLst>
+              <a:ext uri="{FF2B5EF4-FFF2-40B4-BE49-F238E27FC236}">
+                <a16:creationId xmlns:a16="http://schemas.microsoft.com/office/drawing/2014/main" id="{FD85A7F6-F302-6347-93C9-1D6797EE6869}"/>
+              </a:ext>
+            </a:extLst>
+          </p:cNvPr>
+          <p:cNvSpPr/>
+          <p:nvPr/>
+        </p:nvSpPr>
+        <p:spPr>
+          <a:xfrm>
+            <a:off x="2492476" y="904566"/>
+            <a:ext cx="2359743" cy="1120877"/>
+          </a:xfrm>
+          <a:prstGeom prst="roundRect">
+            <a:avLst/>
+          </a:prstGeom>
+          <a:solidFill>
+            <a:schemeClr val="accent2"/>
+          </a:solidFill>
+        </p:spPr>
+        <p:style>
+          <a:lnRef idx="2">
+            <a:schemeClr val="accent1">
+              <a:shade val="50000"/>
+            </a:schemeClr>
+          </a:lnRef>
+          <a:fillRef idx="1">
+            <a:schemeClr val="accent1"/>
+          </a:fillRef>
+          <a:effectRef idx="0">
+            <a:schemeClr val="accent1"/>
+          </a:effectRef>
+          <a:fontRef idx="minor">
+            <a:schemeClr val="lt1"/>
+          </a:fontRef>
+        </p:style>
+        <p:txBody>
+          <a:bodyPr rtlCol="0" anchor="ctr"/>
+          <a:lstStyle/>
+          <a:p>
+            <a:pPr algn="ctr"/>
+            <a:r>
+              <a:rPr lang="en-US" dirty="0">
+                <a:solidFill>
+                  <a:schemeClr val="bg1"/>
+                </a:solidFill>
+              </a:rPr>
+              <a:t>30%</a:t>
+            </a:r>
+          </a:p>
+        </p:txBody>
+      </p:sp>
+      <p:sp>
+        <p:nvSpPr>
+          <p:cNvPr id="7" name="Rounded Rectangle 6">
+            <a:extLst>
+              <a:ext uri="{FF2B5EF4-FFF2-40B4-BE49-F238E27FC236}">
+                <a16:creationId xmlns:a16="http://schemas.microsoft.com/office/drawing/2014/main" id="{D18FA08F-7622-A848-83AE-E5C576099B31}"/>
+              </a:ext>
+            </a:extLst>
+          </p:cNvPr>
+          <p:cNvSpPr/>
+          <p:nvPr/>
+        </p:nvSpPr>
+        <p:spPr>
+          <a:xfrm>
+            <a:off x="2492476" y="2482644"/>
+            <a:ext cx="4955459" cy="1120877"/>
+          </a:xfrm>
+          <a:prstGeom prst="roundRect">
+            <a:avLst/>
+          </a:prstGeom>
+          <a:solidFill>
+            <a:schemeClr val="accent2"/>
+          </a:solidFill>
+        </p:spPr>
+        <p:style>
+          <a:lnRef idx="2">
+            <a:schemeClr val="accent1">
+              <a:shade val="50000"/>
+            </a:schemeClr>
+          </a:lnRef>
+          <a:fillRef idx="1">
+            <a:schemeClr val="accent1"/>
+          </a:fillRef>
+          <a:effectRef idx="0">
+            <a:schemeClr val="accent1"/>
+          </a:effectRef>
+          <a:fontRef idx="minor">
+            <a:schemeClr val="lt1"/>
+          </a:fontRef>
+        </p:style>
+        <p:txBody>
+          <a:bodyPr rtlCol="0" anchor="ctr"/>
+          <a:lstStyle/>
+          <a:p>
+            <a:pPr algn="ctr"/>
+            <a:r>
+              <a:rPr lang="en-US" dirty="0"/>
+              <a:t>80%</a:t>
+            </a:r>
+          </a:p>
+        </p:txBody>
+      </p:sp>
+      <p:cxnSp>
+        <p:nvCxnSpPr>
+          <p:cNvPr id="9" name="Straight Connector 8">
+            <a:extLst>
+              <a:ext uri="{FF2B5EF4-FFF2-40B4-BE49-F238E27FC236}">
+                <a16:creationId xmlns:a16="http://schemas.microsoft.com/office/drawing/2014/main" id="{4FB524E9-D1A5-9746-A8B9-7B7016061E82}"/>
+              </a:ext>
+            </a:extLst>
+          </p:cNvPr>
+          <p:cNvCxnSpPr/>
+          <p:nvPr/>
+        </p:nvCxnSpPr>
+        <p:spPr>
+          <a:xfrm>
+            <a:off x="4852219" y="280219"/>
+            <a:ext cx="0" cy="4055807"/>
+          </a:xfrm>
+          <a:prstGeom prst="line">
+            <a:avLst/>
+          </a:prstGeom>
+        </p:spPr>
+        <p:style>
+          <a:lnRef idx="1">
+            <a:schemeClr val="accent1"/>
+          </a:lnRef>
+          <a:fillRef idx="0">
+            <a:schemeClr val="accent1"/>
+          </a:fillRef>
+          <a:effectRef idx="0">
+            <a:schemeClr val="accent1"/>
+          </a:effectRef>
+          <a:fontRef idx="minor">
+            <a:schemeClr val="tx1"/>
+          </a:fontRef>
+        </p:style>
+      </p:cxnSp>
+      <p:cxnSp>
+        <p:nvCxnSpPr>
+          <p:cNvPr id="10" name="Straight Connector 9">
+            <a:extLst>
+              <a:ext uri="{FF2B5EF4-FFF2-40B4-BE49-F238E27FC236}">
+                <a16:creationId xmlns:a16="http://schemas.microsoft.com/office/drawing/2014/main" id="{23B99CC1-04B2-B443-B0B0-56CCA4B3D1D2}"/>
+              </a:ext>
+            </a:extLst>
+          </p:cNvPr>
+          <p:cNvCxnSpPr/>
+          <p:nvPr/>
+        </p:nvCxnSpPr>
+        <p:spPr>
+          <a:xfrm>
+            <a:off x="7482348" y="280219"/>
+            <a:ext cx="0" cy="4055807"/>
+          </a:xfrm>
+          <a:prstGeom prst="line">
+            <a:avLst/>
+          </a:prstGeom>
+        </p:spPr>
+        <p:style>
+          <a:lnRef idx="1">
+            <a:schemeClr val="accent1"/>
+          </a:lnRef>
+          <a:fillRef idx="0">
+            <a:schemeClr val="accent1"/>
+          </a:fillRef>
+          <a:effectRef idx="0">
+            <a:schemeClr val="accent1"/>
+          </a:effectRef>
+          <a:fontRef idx="minor">
+            <a:schemeClr val="tx1"/>
+          </a:fontRef>
+        </p:style>
+      </p:cxnSp>
+      <p:sp>
+        <p:nvSpPr>
+          <p:cNvPr id="11" name="Rectangle 10">
+            <a:extLst>
+              <a:ext uri="{FF2B5EF4-FFF2-40B4-BE49-F238E27FC236}">
+                <a16:creationId xmlns:a16="http://schemas.microsoft.com/office/drawing/2014/main" id="{C6E47E39-2F06-544D-9331-75993EBF352B}"/>
+              </a:ext>
+            </a:extLst>
+          </p:cNvPr>
+          <p:cNvSpPr/>
+          <p:nvPr/>
+        </p:nvSpPr>
+        <p:spPr>
+          <a:xfrm>
+            <a:off x="2492476" y="4586748"/>
+            <a:ext cx="2359743" cy="442452"/>
+          </a:xfrm>
+          <a:prstGeom prst="rect">
+            <a:avLst/>
+          </a:prstGeom>
+          <a:solidFill>
+            <a:schemeClr val="accent6"/>
+          </a:solidFill>
+        </p:spPr>
+        <p:style>
+          <a:lnRef idx="2">
+            <a:schemeClr val="accent1">
+              <a:shade val="50000"/>
+            </a:schemeClr>
+          </a:lnRef>
+          <a:fillRef idx="1">
+            <a:schemeClr val="accent1"/>
+          </a:fillRef>
+          <a:effectRef idx="0">
+            <a:schemeClr val="accent1"/>
+          </a:effectRef>
+          <a:fontRef idx="minor">
+            <a:schemeClr val="lt1"/>
+          </a:fontRef>
+        </p:style>
+        <p:txBody>
+          <a:bodyPr rtlCol="0" anchor="ctr"/>
+          <a:lstStyle/>
+          <a:p>
+            <a:pPr algn="ctr"/>
+            <a:r>
+              <a:rPr lang="en-US" dirty="0"/>
+              <a:t>IGUAL</a:t>
+            </a:r>
+          </a:p>
+        </p:txBody>
+      </p:sp>
+      <p:sp>
+        <p:nvSpPr>
+          <p:cNvPr id="12" name="Rectangle 11">
+            <a:extLst>
+              <a:ext uri="{FF2B5EF4-FFF2-40B4-BE49-F238E27FC236}">
+                <a16:creationId xmlns:a16="http://schemas.microsoft.com/office/drawing/2014/main" id="{895E2C3A-940D-3444-B812-BB25CB720D6C}"/>
+              </a:ext>
+            </a:extLst>
+          </p:cNvPr>
+          <p:cNvSpPr/>
+          <p:nvPr/>
+        </p:nvSpPr>
+        <p:spPr>
+          <a:xfrm>
+            <a:off x="4852219" y="4586748"/>
+            <a:ext cx="2630126" cy="442452"/>
+          </a:xfrm>
+          <a:prstGeom prst="rect">
+            <a:avLst/>
+          </a:prstGeom>
+          <a:solidFill>
+            <a:schemeClr val="tx1"/>
+          </a:solidFill>
+        </p:spPr>
+        <p:style>
+          <a:lnRef idx="2">
+            <a:schemeClr val="accent1">
+              <a:shade val="50000"/>
+            </a:schemeClr>
+          </a:lnRef>
+          <a:fillRef idx="1">
+            <a:schemeClr val="accent1"/>
+          </a:fillRef>
+          <a:effectRef idx="0">
+            <a:schemeClr val="accent1"/>
+          </a:effectRef>
+          <a:fontRef idx="minor">
+            <a:schemeClr val="lt1"/>
+          </a:fontRef>
+        </p:style>
+        <p:txBody>
+          <a:bodyPr rtlCol="0" anchor="ctr"/>
+          <a:lstStyle/>
+          <a:p>
+            <a:pPr algn="ctr"/>
+            <a:r>
+              <a:rPr lang="en-US" dirty="0"/>
+              <a:t>DIFERENTE</a:t>
+            </a:r>
+          </a:p>
+        </p:txBody>
+      </p:sp>
+      <p:sp>
+        <p:nvSpPr>
+          <p:cNvPr id="13" name="Rectangle 12">
+            <a:extLst>
+              <a:ext uri="{FF2B5EF4-FFF2-40B4-BE49-F238E27FC236}">
+                <a16:creationId xmlns:a16="http://schemas.microsoft.com/office/drawing/2014/main" id="{C022FB68-A264-1D44-A258-9A6B7138A325}"/>
+              </a:ext>
+            </a:extLst>
+          </p:cNvPr>
+          <p:cNvSpPr/>
+          <p:nvPr/>
+        </p:nvSpPr>
+        <p:spPr>
+          <a:xfrm>
+            <a:off x="7482346" y="4586748"/>
+            <a:ext cx="1897628" cy="442452"/>
+          </a:xfrm>
+          <a:prstGeom prst="rect">
+            <a:avLst/>
+          </a:prstGeom>
+          <a:solidFill>
+            <a:schemeClr val="accent6"/>
+          </a:solidFill>
+        </p:spPr>
+        <p:style>
+          <a:lnRef idx="2">
+            <a:schemeClr val="accent1">
+              <a:shade val="50000"/>
+            </a:schemeClr>
+          </a:lnRef>
+          <a:fillRef idx="1">
+            <a:schemeClr val="accent1"/>
+          </a:fillRef>
+          <a:effectRef idx="0">
+            <a:schemeClr val="accent1"/>
+          </a:effectRef>
+          <a:fontRef idx="minor">
+            <a:schemeClr val="lt1"/>
+          </a:fontRef>
+        </p:style>
+        <p:txBody>
+          <a:bodyPr rtlCol="0" anchor="ctr"/>
+          <a:lstStyle/>
+          <a:p>
+            <a:pPr algn="ctr"/>
+            <a:r>
+              <a:rPr lang="en-US" dirty="0"/>
+              <a:t>IGUAL</a:t>
+            </a:r>
+          </a:p>
+        </p:txBody>
+      </p:sp>
+      <p:sp>
+        <p:nvSpPr>
+          <p:cNvPr id="14" name="TextBox 13">
+            <a:extLst>
+              <a:ext uri="{FF2B5EF4-FFF2-40B4-BE49-F238E27FC236}">
+                <a16:creationId xmlns:a16="http://schemas.microsoft.com/office/drawing/2014/main" id="{3BC3B1A6-0865-AF45-B035-6DC236EDF480}"/>
+              </a:ext>
+            </a:extLst>
+          </p:cNvPr>
+          <p:cNvSpPr txBox="1"/>
+          <p:nvPr/>
+        </p:nvSpPr>
+        <p:spPr>
+          <a:xfrm>
+            <a:off x="2609270" y="3854243"/>
+            <a:ext cx="2100383" cy="369332"/>
+          </a:xfrm>
+          <a:prstGeom prst="rect">
+            <a:avLst/>
+          </a:prstGeom>
+          <a:noFill/>
+        </p:spPr>
+        <p:txBody>
+          <a:bodyPr wrap="none" rtlCol="0">
+            <a:spAutoFit/>
+          </a:bodyPr>
+          <a:lstStyle/>
+          <a:p>
+            <a:r>
+              <a:rPr lang="en-US" dirty="0"/>
+              <a:t>%1 = MENOR VALOR</a:t>
+            </a:r>
+          </a:p>
+        </p:txBody>
+      </p:sp>
+      <p:sp>
+        <p:nvSpPr>
+          <p:cNvPr id="15" name="TextBox 14">
+            <a:extLst>
+              <a:ext uri="{FF2B5EF4-FFF2-40B4-BE49-F238E27FC236}">
+                <a16:creationId xmlns:a16="http://schemas.microsoft.com/office/drawing/2014/main" id="{0D8F7EF9-578E-264F-BBE1-D03B1F4C21E3}"/>
+              </a:ext>
+            </a:extLst>
+          </p:cNvPr>
+          <p:cNvSpPr txBox="1"/>
+          <p:nvPr/>
+        </p:nvSpPr>
+        <p:spPr>
+          <a:xfrm>
+            <a:off x="7516762" y="3854243"/>
+            <a:ext cx="2767232" cy="369332"/>
+          </a:xfrm>
+          <a:prstGeom prst="rect">
+            <a:avLst/>
+          </a:prstGeom>
+          <a:noFill/>
+        </p:spPr>
+        <p:txBody>
+          <a:bodyPr wrap="none" rtlCol="0">
+            <a:spAutoFit/>
+          </a:bodyPr>
+          <a:lstStyle/>
+          <a:p>
+            <a:r>
+              <a:rPr lang="en-US" dirty="0"/>
+              <a:t>%2 = 100% – MAIOR VALOR</a:t>
+            </a:r>
+          </a:p>
+        </p:txBody>
+      </p:sp>
+      <p:sp>
+        <p:nvSpPr>
+          <p:cNvPr id="16" name="TextBox 15">
+            <a:extLst>
+              <a:ext uri="{FF2B5EF4-FFF2-40B4-BE49-F238E27FC236}">
+                <a16:creationId xmlns:a16="http://schemas.microsoft.com/office/drawing/2014/main" id="{8E3EB5DA-2E49-A946-A397-FD7F0564BC45}"/>
+              </a:ext>
+            </a:extLst>
+          </p:cNvPr>
+          <p:cNvSpPr txBox="1"/>
+          <p:nvPr/>
+        </p:nvSpPr>
+        <p:spPr>
+          <a:xfrm>
+            <a:off x="2609269" y="5652614"/>
+            <a:ext cx="1933286" cy="369332"/>
+          </a:xfrm>
+          <a:prstGeom prst="rect">
+            <a:avLst/>
+          </a:prstGeom>
+          <a:noFill/>
+        </p:spPr>
+        <p:txBody>
+          <a:bodyPr wrap="none" rtlCol="0">
+            <a:spAutoFit/>
+          </a:bodyPr>
+          <a:lstStyle/>
+          <a:p>
+            <a:r>
+              <a:rPr lang="en-US" dirty="0"/>
+              <a:t>%IGUAL = %1 + %2</a:t>
+            </a:r>
+          </a:p>
+        </p:txBody>
+      </p:sp>
+      <p:sp>
+        <p:nvSpPr>
+          <p:cNvPr id="17" name="TextBox 16">
+            <a:extLst>
+              <a:ext uri="{FF2B5EF4-FFF2-40B4-BE49-F238E27FC236}">
+                <a16:creationId xmlns:a16="http://schemas.microsoft.com/office/drawing/2014/main" id="{2069980C-D195-6441-965D-10F9873D6C87}"/>
+              </a:ext>
+            </a:extLst>
+          </p:cNvPr>
+          <p:cNvSpPr txBox="1"/>
+          <p:nvPr/>
+        </p:nvSpPr>
+        <p:spPr>
+          <a:xfrm>
+            <a:off x="2458063" y="538314"/>
+            <a:ext cx="2027222" cy="369332"/>
+          </a:xfrm>
+          <a:prstGeom prst="rect">
+            <a:avLst/>
+          </a:prstGeom>
+          <a:noFill/>
+        </p:spPr>
+        <p:txBody>
+          <a:bodyPr wrap="none" rtlCol="0">
+            <a:spAutoFit/>
+          </a:bodyPr>
+          <a:lstStyle/>
+          <a:p>
+            <a:r>
+              <a:rPr lang="en-US" dirty="0"/>
+              <a:t>Interesses </a:t>
+            </a:r>
+            <a:r>
+              <a:rPr lang="en-US" dirty="0" err="1"/>
+              <a:t>artísticos</a:t>
+            </a:r>
+            <a:endParaRPr lang="en-US" dirty="0"/>
+          </a:p>
+        </p:txBody>
+      </p:sp>
+      <p:sp>
+        <p:nvSpPr>
+          <p:cNvPr id="18" name="TextBox 17">
+            <a:extLst>
+              <a:ext uri="{FF2B5EF4-FFF2-40B4-BE49-F238E27FC236}">
+                <a16:creationId xmlns:a16="http://schemas.microsoft.com/office/drawing/2014/main" id="{84E763A7-1AD5-C449-98B2-334A1F4C0BB6}"/>
+              </a:ext>
+            </a:extLst>
+          </p:cNvPr>
+          <p:cNvSpPr txBox="1"/>
+          <p:nvPr/>
+        </p:nvSpPr>
+        <p:spPr>
+          <a:xfrm>
+            <a:off x="2492476" y="2103944"/>
+            <a:ext cx="2027222" cy="369332"/>
+          </a:xfrm>
+          <a:prstGeom prst="rect">
+            <a:avLst/>
+          </a:prstGeom>
+          <a:noFill/>
+        </p:spPr>
+        <p:txBody>
+          <a:bodyPr wrap="none" rtlCol="0">
+            <a:spAutoFit/>
+          </a:bodyPr>
+          <a:lstStyle/>
+          <a:p>
+            <a:r>
+              <a:rPr lang="en-US" dirty="0"/>
+              <a:t>Interesses </a:t>
+            </a:r>
+            <a:r>
+              <a:rPr lang="en-US" dirty="0" err="1"/>
+              <a:t>artísticos</a:t>
+            </a:r>
+            <a:endParaRPr lang="en-US" dirty="0"/>
+          </a:p>
+        </p:txBody>
+      </p:sp>
+      <p:sp>
+        <p:nvSpPr>
+          <p:cNvPr id="19" name="TextBox 18">
+            <a:extLst>
+              <a:ext uri="{FF2B5EF4-FFF2-40B4-BE49-F238E27FC236}">
+                <a16:creationId xmlns:a16="http://schemas.microsoft.com/office/drawing/2014/main" id="{07E74655-6536-3A4E-B017-02A71B6065C3}"/>
+              </a:ext>
+            </a:extLst>
+          </p:cNvPr>
+          <p:cNvSpPr txBox="1"/>
+          <p:nvPr/>
+        </p:nvSpPr>
+        <p:spPr>
+          <a:xfrm>
+            <a:off x="6845027" y="535234"/>
+            <a:ext cx="2480872" cy="369332"/>
+          </a:xfrm>
+          <a:prstGeom prst="rect">
+            <a:avLst/>
+          </a:prstGeom>
+          <a:noFill/>
+        </p:spPr>
+        <p:txBody>
+          <a:bodyPr wrap="none" rtlCol="0">
+            <a:spAutoFit/>
+          </a:bodyPr>
+          <a:lstStyle/>
+          <a:p>
+            <a:r>
+              <a:rPr lang="en-US" dirty="0"/>
+              <a:t>Sem interesses </a:t>
+            </a:r>
+            <a:r>
+              <a:rPr lang="en-US" dirty="0" err="1"/>
+              <a:t>artísticos</a:t>
+            </a:r>
+            <a:endParaRPr lang="en-US" dirty="0"/>
+          </a:p>
+        </p:txBody>
+      </p:sp>
+      <p:sp>
+        <p:nvSpPr>
+          <p:cNvPr id="20" name="TextBox 19">
+            <a:extLst>
+              <a:ext uri="{FF2B5EF4-FFF2-40B4-BE49-F238E27FC236}">
+                <a16:creationId xmlns:a16="http://schemas.microsoft.com/office/drawing/2014/main" id="{08D6EC0F-C39F-9A40-9E9D-15C2E477440C}"/>
+              </a:ext>
+            </a:extLst>
+          </p:cNvPr>
+          <p:cNvSpPr txBox="1"/>
+          <p:nvPr/>
+        </p:nvSpPr>
+        <p:spPr>
+          <a:xfrm>
+            <a:off x="6928604" y="2074294"/>
+            <a:ext cx="2480872" cy="369332"/>
+          </a:xfrm>
+          <a:prstGeom prst="rect">
+            <a:avLst/>
+          </a:prstGeom>
+          <a:noFill/>
+        </p:spPr>
+        <p:txBody>
+          <a:bodyPr wrap="none" rtlCol="0">
+            <a:spAutoFit/>
+          </a:bodyPr>
+          <a:lstStyle/>
+          <a:p>
+            <a:r>
+              <a:rPr lang="en-US" dirty="0"/>
+              <a:t>Sem interesses </a:t>
+            </a:r>
+            <a:r>
+              <a:rPr lang="en-US" dirty="0" err="1"/>
+              <a:t>artísticos</a:t>
+            </a:r>
+            <a:endParaRPr lang="en-US" dirty="0"/>
+          </a:p>
+        </p:txBody>
+      </p:sp>
+      <p:cxnSp>
+        <p:nvCxnSpPr>
+          <p:cNvPr id="22" name="Curved Connector 21">
+            <a:extLst>
+              <a:ext uri="{FF2B5EF4-FFF2-40B4-BE49-F238E27FC236}">
+                <a16:creationId xmlns:a16="http://schemas.microsoft.com/office/drawing/2014/main" id="{D32A4788-ED87-D148-BE2B-07672180D1C3}"/>
+              </a:ext>
+            </a:extLst>
+          </p:cNvPr>
+          <p:cNvCxnSpPr>
+            <a:cxnSpLocks/>
+            <a:stCxn id="17" idx="1"/>
+          </p:cNvCxnSpPr>
+          <p:nvPr/>
+        </p:nvCxnSpPr>
+        <p:spPr>
+          <a:xfrm rot="10800000" flipH="1" flipV="1">
+            <a:off x="2458063" y="722980"/>
+            <a:ext cx="872614" cy="751858"/>
+          </a:xfrm>
+          <a:prstGeom prst="curvedConnector3">
+            <a:avLst>
+              <a:gd name="adj1" fmla="val -26197"/>
+            </a:avLst>
+          </a:prstGeom>
+          <a:ln>
+            <a:solidFill>
+              <a:schemeClr val="tx1"/>
+            </a:solidFill>
+            <a:tailEnd type="triangle"/>
+          </a:ln>
+        </p:spPr>
+        <p:style>
+          <a:lnRef idx="1">
+            <a:schemeClr val="accent1"/>
+          </a:lnRef>
+          <a:fillRef idx="0">
+            <a:schemeClr val="accent1"/>
+          </a:fillRef>
+          <a:effectRef idx="0">
+            <a:schemeClr val="accent1"/>
+          </a:effectRef>
+          <a:fontRef idx="minor">
+            <a:schemeClr val="tx1"/>
+          </a:fontRef>
+        </p:style>
+      </p:cxnSp>
+      <p:cxnSp>
+        <p:nvCxnSpPr>
+          <p:cNvPr id="26" name="Curved Connector 25">
+            <a:extLst>
+              <a:ext uri="{FF2B5EF4-FFF2-40B4-BE49-F238E27FC236}">
+                <a16:creationId xmlns:a16="http://schemas.microsoft.com/office/drawing/2014/main" id="{EB38BA15-2B3E-624A-9BEE-33ED864DEFD0}"/>
+              </a:ext>
+            </a:extLst>
+          </p:cNvPr>
+          <p:cNvCxnSpPr>
+            <a:cxnSpLocks/>
+          </p:cNvCxnSpPr>
+          <p:nvPr/>
+        </p:nvCxnSpPr>
+        <p:spPr>
+          <a:xfrm>
+            <a:off x="2440307" y="2349746"/>
+            <a:ext cx="2079391" cy="658923"/>
+          </a:xfrm>
+          <a:prstGeom prst="curvedConnector3">
+            <a:avLst>
+              <a:gd name="adj1" fmla="val -15962"/>
+            </a:avLst>
+          </a:prstGeom>
+          <a:ln>
+            <a:solidFill>
+              <a:schemeClr val="tx1"/>
+            </a:solidFill>
+            <a:tailEnd type="triangle"/>
+          </a:ln>
+        </p:spPr>
+        <p:style>
+          <a:lnRef idx="1">
+            <a:schemeClr val="accent1"/>
+          </a:lnRef>
+          <a:fillRef idx="0">
+            <a:schemeClr val="accent1"/>
+          </a:fillRef>
+          <a:effectRef idx="0">
+            <a:schemeClr val="accent1"/>
+          </a:effectRef>
+          <a:fontRef idx="minor">
+            <a:schemeClr val="tx1"/>
+          </a:fontRef>
+        </p:style>
+      </p:cxnSp>
+      <p:cxnSp>
+        <p:nvCxnSpPr>
+          <p:cNvPr id="29" name="Curved Connector 28">
+            <a:extLst>
+              <a:ext uri="{FF2B5EF4-FFF2-40B4-BE49-F238E27FC236}">
+                <a16:creationId xmlns:a16="http://schemas.microsoft.com/office/drawing/2014/main" id="{A6876DF3-EEEA-1B45-9470-978A6D5077C7}"/>
+              </a:ext>
+            </a:extLst>
+          </p:cNvPr>
+          <p:cNvCxnSpPr>
+            <a:cxnSpLocks/>
+          </p:cNvCxnSpPr>
+          <p:nvPr/>
+        </p:nvCxnSpPr>
+        <p:spPr>
+          <a:xfrm rot="10800000" flipV="1">
+            <a:off x="6391514" y="713146"/>
+            <a:ext cx="3051822" cy="761692"/>
+          </a:xfrm>
+          <a:prstGeom prst="curvedConnector3">
+            <a:avLst>
+              <a:gd name="adj1" fmla="val -17657"/>
+            </a:avLst>
+          </a:prstGeom>
+          <a:ln>
+            <a:solidFill>
+              <a:schemeClr val="tx1"/>
+            </a:solidFill>
+            <a:tailEnd type="triangle"/>
+          </a:ln>
+        </p:spPr>
+        <p:style>
+          <a:lnRef idx="1">
+            <a:schemeClr val="accent1"/>
+          </a:lnRef>
+          <a:fillRef idx="0">
+            <a:schemeClr val="accent1"/>
+          </a:fillRef>
+          <a:effectRef idx="0">
+            <a:schemeClr val="accent1"/>
+          </a:effectRef>
+          <a:fontRef idx="minor">
+            <a:schemeClr val="tx1"/>
+          </a:fontRef>
+        </p:style>
+      </p:cxnSp>
+      <p:cxnSp>
+        <p:nvCxnSpPr>
+          <p:cNvPr id="34" name="Curved Connector 33">
+            <a:extLst>
+              <a:ext uri="{FF2B5EF4-FFF2-40B4-BE49-F238E27FC236}">
+                <a16:creationId xmlns:a16="http://schemas.microsoft.com/office/drawing/2014/main" id="{A515C52C-7AA4-8A4E-B21C-6C9C9EB9759D}"/>
+              </a:ext>
+            </a:extLst>
+          </p:cNvPr>
+          <p:cNvCxnSpPr>
+            <a:cxnSpLocks/>
+            <a:stCxn id="20" idx="3"/>
+          </p:cNvCxnSpPr>
+          <p:nvPr/>
+        </p:nvCxnSpPr>
+        <p:spPr>
+          <a:xfrm flipH="1">
+            <a:off x="8929672" y="2258960"/>
+            <a:ext cx="479804" cy="801094"/>
+          </a:xfrm>
+          <a:prstGeom prst="curvedConnector4">
+            <a:avLst>
+              <a:gd name="adj1" fmla="val -47644"/>
+              <a:gd name="adj2" fmla="val 107552"/>
+            </a:avLst>
+          </a:prstGeom>
+          <a:ln>
+            <a:solidFill>
+              <a:schemeClr val="tx1"/>
+            </a:solidFill>
+            <a:tailEnd type="triangle"/>
+          </a:ln>
+        </p:spPr>
+        <p:style>
+          <a:lnRef idx="1">
+            <a:schemeClr val="accent1"/>
+          </a:lnRef>
+          <a:fillRef idx="0">
+            <a:schemeClr val="accent1"/>
+          </a:fillRef>
+          <a:effectRef idx="0">
+            <a:schemeClr val="accent1"/>
+          </a:effectRef>
+          <a:fontRef idx="minor">
+            <a:schemeClr val="tx1"/>
+          </a:fontRef>
+        </p:style>
+      </p:cxnSp>
     </p:spTree>
     <p:extLst>
       <p:ext uri="{BB962C8B-B14F-4D97-AF65-F5344CB8AC3E}">
-        <p14:creationId xmlns:p14="http://schemas.microsoft.com/office/powerpoint/2010/main" val="1751157376"/>
+        <p14:creationId xmlns:p14="http://schemas.microsoft.com/office/powerpoint/2010/main" val="2079777094"/>
       </p:ext>
     </p:extLst>
   </p:cSld>
@@ -5836,7 +6689,7 @@
           <p:cNvPr id="2" name="Title 1">
             <a:extLst>
               <a:ext uri="{FF2B5EF4-FFF2-40B4-BE49-F238E27FC236}">
-                <a16:creationId xmlns:a16="http://schemas.microsoft.com/office/drawing/2014/main" id="{9CBBAB46-E266-0540-9597-BE5E16B1BBA2}"/>
+                <a16:creationId xmlns:a16="http://schemas.microsoft.com/office/drawing/2014/main" id="{56EF0102-41B7-7143-8BF7-A597F4171D68}"/>
               </a:ext>
             </a:extLst>
           </p:cNvPr>
@@ -5847,44 +6700,28 @@
             <p:ph type="title"/>
           </p:nvPr>
         </p:nvSpPr>
-        <p:spPr/>
+        <p:spPr>
+          <a:xfrm>
+            <a:off x="838200" y="2766218"/>
+            <a:ext cx="10515600" cy="1325563"/>
+          </a:xfrm>
+        </p:spPr>
         <p:txBody>
           <a:bodyPr/>
           <a:lstStyle/>
           <a:p>
-            <a:endParaRPr lang="en-US"/>
-          </a:p>
-        </p:txBody>
-      </p:sp>
-      <p:sp>
-        <p:nvSpPr>
-          <p:cNvPr id="3" name="Content Placeholder 2">
-            <a:extLst>
-              <a:ext uri="{FF2B5EF4-FFF2-40B4-BE49-F238E27FC236}">
-                <a16:creationId xmlns:a16="http://schemas.microsoft.com/office/drawing/2014/main" id="{4FF02C9C-4EE2-E946-981B-9506773D0C2C}"/>
-              </a:ext>
-            </a:extLst>
-          </p:cNvPr>
-          <p:cNvSpPr>
-            <a:spLocks noGrp="1"/>
-          </p:cNvSpPr>
-          <p:nvPr>
-            <p:ph idx="1"/>
-          </p:nvPr>
-        </p:nvSpPr>
-        <p:spPr/>
-        <p:txBody>
-          <a:bodyPr/>
-          <a:lstStyle/>
-          <a:p>
-            <a:endParaRPr lang="en-US"/>
+            <a:pPr algn="ctr"/>
+            <a:r>
+              <a:rPr lang="en-US"/>
+              <a:t>TESTES</a:t>
+            </a:r>
           </a:p>
         </p:txBody>
       </p:sp>
     </p:spTree>
     <p:extLst>
       <p:ext uri="{BB962C8B-B14F-4D97-AF65-F5344CB8AC3E}">
-        <p14:creationId xmlns:p14="http://schemas.microsoft.com/office/powerpoint/2010/main" val="562497644"/>
+        <p14:creationId xmlns:p14="http://schemas.microsoft.com/office/powerpoint/2010/main" val="1751157376"/>
       </p:ext>
     </p:extLst>
   </p:cSld>
@@ -5913,62 +6750,58 @@
       </p:grpSpPr>
       <p:sp>
         <p:nvSpPr>
-          <p:cNvPr id="6" name="Title 1">
-            <a:extLst>
-              <a:ext uri="{FF2B5EF4-FFF2-40B4-BE49-F238E27FC236}">
-                <a16:creationId xmlns:a16="http://schemas.microsoft.com/office/drawing/2014/main" id="{CBC05370-F694-154D-A734-65AE737D226D}"/>
-              </a:ext>
-            </a:extLst>
-          </p:cNvPr>
-          <p:cNvSpPr txBox="1">
-            <a:spLocks/>
+          <p:cNvPr id="2" name="Title 1">
+            <a:extLst>
+              <a:ext uri="{FF2B5EF4-FFF2-40B4-BE49-F238E27FC236}">
+                <a16:creationId xmlns:a16="http://schemas.microsoft.com/office/drawing/2014/main" id="{9CBBAB46-E266-0540-9597-BE5E16B1BBA2}"/>
+              </a:ext>
+            </a:extLst>
+          </p:cNvPr>
+          <p:cNvSpPr>
+            <a:spLocks noGrp="1"/>
           </p:cNvSpPr>
-          <p:nvPr/>
-        </p:nvSpPr>
-        <p:spPr>
-          <a:xfrm>
-            <a:off x="838200" y="2766218"/>
-            <a:ext cx="10515600" cy="1325563"/>
-          </a:xfrm>
-          <a:prstGeom prst="rect">
-            <a:avLst/>
-          </a:prstGeom>
-        </p:spPr>
-        <p:txBody>
-          <a:bodyPr vert="horz" lIns="91440" tIns="45720" rIns="91440" bIns="45720" rtlCol="0" anchor="b">
-            <a:normAutofit/>
-          </a:bodyPr>
-          <a:lstStyle>
-            <a:lvl1pPr algn="ctr" defTabSz="914400" rtl="0" eaLnBrk="1" latinLnBrk="0" hangingPunct="1">
-              <a:lnSpc>
-                <a:spcPct val="90000"/>
-              </a:lnSpc>
-              <a:spcBef>
-                <a:spcPct val="0"/>
-              </a:spcBef>
-              <a:buNone/>
-              <a:defRPr sz="6000" kern="1200">
-                <a:solidFill>
-                  <a:schemeClr val="tx1"/>
-                </a:solidFill>
-                <a:latin typeface="+mj-lt"/>
-                <a:ea typeface="+mj-ea"/>
-                <a:cs typeface="+mj-cs"/>
-              </a:defRPr>
-            </a:lvl1pPr>
-          </a:lstStyle>
-          <a:p>
-            <a:r>
-              <a:rPr lang="en-US"/>
-              <a:t>CONSIDERAÇÕES FINAIS</a:t>
-            </a:r>
+          <p:nvPr>
+            <p:ph type="title"/>
+          </p:nvPr>
+        </p:nvSpPr>
+        <p:spPr/>
+        <p:txBody>
+          <a:bodyPr/>
+          <a:lstStyle/>
+          <a:p>
+            <a:endParaRPr lang="en-US"/>
+          </a:p>
+        </p:txBody>
+      </p:sp>
+      <p:sp>
+        <p:nvSpPr>
+          <p:cNvPr id="3" name="Content Placeholder 2">
+            <a:extLst>
+              <a:ext uri="{FF2B5EF4-FFF2-40B4-BE49-F238E27FC236}">
+                <a16:creationId xmlns:a16="http://schemas.microsoft.com/office/drawing/2014/main" id="{4FF02C9C-4EE2-E946-981B-9506773D0C2C}"/>
+              </a:ext>
+            </a:extLst>
+          </p:cNvPr>
+          <p:cNvSpPr>
+            <a:spLocks noGrp="1"/>
+          </p:cNvSpPr>
+          <p:nvPr>
+            <p:ph idx="1"/>
+          </p:nvPr>
+        </p:nvSpPr>
+        <p:spPr/>
+        <p:txBody>
+          <a:bodyPr/>
+          <a:lstStyle/>
+          <a:p>
+            <a:endParaRPr lang="en-US"/>
           </a:p>
         </p:txBody>
       </p:sp>
     </p:spTree>
     <p:extLst>
       <p:ext uri="{BB962C8B-B14F-4D97-AF65-F5344CB8AC3E}">
-        <p14:creationId xmlns:p14="http://schemas.microsoft.com/office/powerpoint/2010/main" val="149097043"/>
+        <p14:creationId xmlns:p14="http://schemas.microsoft.com/office/powerpoint/2010/main" val="562497644"/>
       </p:ext>
     </p:extLst>
   </p:cSld>
@@ -5997,352 +6830,62 @@
       </p:grpSpPr>
       <p:sp>
         <p:nvSpPr>
-          <p:cNvPr id="2" name="Title 1">
-            <a:extLst>
-              <a:ext uri="{FF2B5EF4-FFF2-40B4-BE49-F238E27FC236}">
-                <a16:creationId xmlns:a16="http://schemas.microsoft.com/office/drawing/2014/main" id="{79003326-FD5F-6C4E-8F9C-898BFB962998}"/>
-              </a:ext>
-            </a:extLst>
-          </p:cNvPr>
-          <p:cNvSpPr>
-            <a:spLocks noGrp="1"/>
+          <p:cNvPr id="6" name="Title 1">
+            <a:extLst>
+              <a:ext uri="{FF2B5EF4-FFF2-40B4-BE49-F238E27FC236}">
+                <a16:creationId xmlns:a16="http://schemas.microsoft.com/office/drawing/2014/main" id="{CBC05370-F694-154D-A734-65AE737D226D}"/>
+              </a:ext>
+            </a:extLst>
+          </p:cNvPr>
+          <p:cNvSpPr txBox="1">
+            <a:spLocks/>
           </p:cNvSpPr>
-          <p:nvPr>
-            <p:ph type="title"/>
-          </p:nvPr>
-        </p:nvSpPr>
-        <p:spPr/>
-        <p:txBody>
-          <a:bodyPr/>
-          <a:lstStyle/>
-          <a:p>
-            <a:r>
-              <a:rPr lang="en-US" err="1"/>
-              <a:t>Desafios</a:t>
-            </a:r>
-            <a:endParaRPr lang="en-US"/>
-          </a:p>
-        </p:txBody>
-      </p:sp>
-      <p:sp>
-        <p:nvSpPr>
-          <p:cNvPr id="3" name="Content Placeholder 2">
-            <a:extLst>
-              <a:ext uri="{FF2B5EF4-FFF2-40B4-BE49-F238E27FC236}">
-                <a16:creationId xmlns:a16="http://schemas.microsoft.com/office/drawing/2014/main" id="{AF284CC7-39D2-7A47-BE98-2335EEF07631}"/>
-              </a:ext>
-            </a:extLst>
-          </p:cNvPr>
-          <p:cNvSpPr>
-            <a:spLocks noGrp="1"/>
-          </p:cNvSpPr>
-          <p:nvPr>
-            <p:ph idx="1"/>
-          </p:nvPr>
-        </p:nvSpPr>
-        <p:spPr/>
-        <p:txBody>
-          <a:bodyPr/>
-          <a:lstStyle/>
-          <a:p>
-            <a:r>
-              <a:rPr lang="en-US" err="1"/>
-              <a:t>Instabilidade</a:t>
-            </a:r>
-            <a:r>
-              <a:rPr lang="en-US"/>
-              <a:t> da </a:t>
-            </a:r>
-            <a:r>
-              <a:rPr lang="en-US" err="1"/>
-              <a:t>linguagem</a:t>
-            </a:r>
-            <a:r>
-              <a:rPr lang="en-US"/>
-              <a:t> e das </a:t>
-            </a:r>
-            <a:r>
-              <a:rPr lang="en-US" err="1"/>
-              <a:t>bibliotecas</a:t>
-            </a:r>
-            <a:r>
-              <a:rPr lang="en-US"/>
-              <a:t>. </a:t>
-            </a:r>
-          </a:p>
-          <a:p>
-            <a:r>
-              <a:rPr lang="en-US" err="1"/>
-              <a:t>Documentação</a:t>
-            </a:r>
-            <a:r>
-              <a:rPr lang="en-US"/>
-              <a:t> </a:t>
-            </a:r>
-            <a:r>
-              <a:rPr lang="en-US" err="1"/>
-              <a:t>desatualizada</a:t>
-            </a:r>
-            <a:r>
-              <a:rPr lang="en-US"/>
-              <a:t> de </a:t>
-            </a:r>
-            <a:r>
-              <a:rPr lang="en-US" err="1"/>
-              <a:t>algumas</a:t>
-            </a:r>
-            <a:r>
-              <a:rPr lang="en-US"/>
-              <a:t> </a:t>
-            </a:r>
-            <a:r>
-              <a:rPr lang="en-US" err="1"/>
-              <a:t>bibliotecas</a:t>
-            </a:r>
-            <a:r>
-              <a:rPr lang="en-US"/>
-              <a:t>.</a:t>
-            </a:r>
-          </a:p>
-          <a:p>
-            <a:r>
-              <a:rPr lang="en-US" err="1"/>
-              <a:t>Aprender</a:t>
-            </a:r>
-            <a:r>
-              <a:rPr lang="en-US"/>
-              <a:t> a </a:t>
-            </a:r>
-            <a:r>
-              <a:rPr lang="en-US" err="1"/>
-              <a:t>utilizar</a:t>
-            </a:r>
-            <a:r>
-              <a:rPr lang="en-US"/>
-              <a:t> as </a:t>
-            </a:r>
-            <a:r>
-              <a:rPr lang="en-US" err="1"/>
-              <a:t>bibliotecas</a:t>
-            </a:r>
-            <a:r>
-              <a:rPr lang="en-US"/>
-              <a:t> do Watson e Facebook.</a:t>
-            </a:r>
-          </a:p>
-          <a:p>
-            <a:r>
-              <a:rPr lang="en-US"/>
-              <a:t>Bugs </a:t>
-            </a:r>
-            <a:r>
-              <a:rPr lang="en-US" err="1"/>
-              <a:t>na</a:t>
-            </a:r>
-            <a:r>
-              <a:rPr lang="en-US"/>
-              <a:t> </a:t>
-            </a:r>
-            <a:r>
-              <a:rPr lang="en-US" err="1"/>
-              <a:t>instalação</a:t>
-            </a:r>
-            <a:r>
-              <a:rPr lang="en-US"/>
-              <a:t> das </a:t>
-            </a:r>
-            <a:r>
-              <a:rPr lang="en-US" err="1"/>
-              <a:t>bibliotecas</a:t>
-            </a:r>
-            <a:r>
-              <a:rPr lang="en-US"/>
-              <a:t>, no </a:t>
-            </a:r>
-            <a:r>
-              <a:rPr lang="en-US" err="1"/>
-              <a:t>simulador</a:t>
-            </a:r>
-            <a:r>
-              <a:rPr lang="en-US"/>
-              <a:t> e </a:t>
-            </a:r>
-            <a:r>
-              <a:rPr lang="en-US" err="1"/>
-              <a:t>na</a:t>
-            </a:r>
-            <a:r>
-              <a:rPr lang="en-US"/>
-              <a:t> IDE.</a:t>
-            </a:r>
-          </a:p>
-          <a:p>
-            <a:r>
-              <a:rPr lang="en-US" err="1"/>
-              <a:t>Depuração</a:t>
-            </a:r>
-            <a:r>
-              <a:rPr lang="en-US"/>
-              <a:t>: </a:t>
-            </a:r>
-            <a:r>
-              <a:rPr lang="en-US" err="1"/>
-              <a:t>dificuldade</a:t>
-            </a:r>
-            <a:r>
-              <a:rPr lang="en-US"/>
-              <a:t> de </a:t>
-            </a:r>
-            <a:r>
-              <a:rPr lang="en-US" err="1"/>
-              <a:t>obtenção</a:t>
-            </a:r>
-            <a:r>
-              <a:rPr lang="en-US"/>
-              <a:t> de </a:t>
-            </a:r>
-            <a:r>
-              <a:rPr lang="en-US" err="1"/>
-              <a:t>informações</a:t>
-            </a:r>
-            <a:r>
-              <a:rPr lang="en-US"/>
-              <a:t> para </a:t>
-            </a:r>
-            <a:r>
-              <a:rPr lang="en-US" err="1"/>
-              <a:t>solução</a:t>
-            </a:r>
-            <a:r>
-              <a:rPr lang="en-US"/>
-              <a:t> dos </a:t>
-            </a:r>
-            <a:r>
-              <a:rPr lang="en-US" err="1"/>
-              <a:t>erros</a:t>
-            </a:r>
-            <a:r>
-              <a:rPr lang="en-US"/>
-              <a:t> </a:t>
-            </a:r>
-            <a:r>
-              <a:rPr lang="en-US" err="1"/>
-              <a:t>identificados</a:t>
-            </a:r>
-            <a:r>
-              <a:rPr lang="en-US"/>
-              <a:t> </a:t>
-            </a:r>
-            <a:r>
-              <a:rPr lang="en-US" err="1"/>
-              <a:t>durante</a:t>
-            </a:r>
-            <a:r>
-              <a:rPr lang="en-US"/>
-              <a:t> </a:t>
-            </a:r>
-            <a:r>
-              <a:rPr lang="en-US" err="1"/>
-              <a:t>os</a:t>
-            </a:r>
-            <a:r>
-              <a:rPr lang="en-US"/>
-              <a:t> testes</a:t>
-            </a:r>
-          </a:p>
-          <a:p>
-            <a:r>
-              <a:rPr lang="en-US" err="1"/>
-              <a:t>Desenvolver</a:t>
-            </a:r>
-            <a:r>
-              <a:rPr lang="en-US"/>
-              <a:t> um </a:t>
-            </a:r>
-            <a:r>
-              <a:rPr lang="en-US" err="1"/>
-              <a:t>algoritmo</a:t>
-            </a:r>
-            <a:r>
-              <a:rPr lang="en-US"/>
-              <a:t> de ranking para </a:t>
-            </a:r>
-            <a:r>
-              <a:rPr lang="en-US" err="1"/>
-              <a:t>oferecer</a:t>
-            </a:r>
-            <a:r>
-              <a:rPr lang="en-US"/>
-              <a:t> o </a:t>
-            </a:r>
-            <a:r>
-              <a:rPr lang="en-US" err="1"/>
-              <a:t>melhor</a:t>
-            </a:r>
-            <a:r>
-              <a:rPr lang="en-US"/>
-              <a:t> </a:t>
-            </a:r>
-            <a:r>
-              <a:rPr lang="en-US" err="1"/>
-              <a:t>resultado</a:t>
-            </a:r>
-            <a:r>
-              <a:rPr lang="en-US"/>
-              <a:t> </a:t>
-            </a:r>
-            <a:r>
-              <a:rPr lang="en-US" err="1"/>
-              <a:t>na</a:t>
-            </a:r>
-            <a:r>
-              <a:rPr lang="en-US"/>
-              <a:t> </a:t>
-            </a:r>
-            <a:r>
-              <a:rPr lang="en-US" err="1"/>
-              <a:t>busca</a:t>
-            </a:r>
-            <a:r>
-              <a:rPr lang="en-US"/>
-              <a:t> do </a:t>
-            </a:r>
-            <a:r>
-              <a:rPr lang="en-US" err="1"/>
-              <a:t>usuário</a:t>
-            </a:r>
-            <a:r>
-              <a:rPr lang="en-US"/>
-              <a:t>, Segundo </a:t>
-            </a:r>
-            <a:r>
-              <a:rPr lang="en-US" err="1"/>
-              <a:t>suas</a:t>
-            </a:r>
-            <a:r>
-              <a:rPr lang="en-US"/>
-              <a:t> </a:t>
-            </a:r>
-            <a:r>
-              <a:rPr lang="en-US" err="1"/>
-              <a:t>caracteristicas</a:t>
-            </a:r>
-            <a:r>
-              <a:rPr lang="en-US"/>
-              <a:t> de </a:t>
-            </a:r>
-            <a:r>
-              <a:rPr lang="en-US" err="1"/>
-              <a:t>personalidade</a:t>
-            </a:r>
-            <a:endParaRPr lang="en-US"/>
+          <p:nvPr/>
+        </p:nvSpPr>
+        <p:spPr>
+          <a:xfrm>
+            <a:off x="838200" y="2766218"/>
+            <a:ext cx="10515600" cy="1325563"/>
+          </a:xfrm>
+          <a:prstGeom prst="rect">
+            <a:avLst/>
+          </a:prstGeom>
+        </p:spPr>
+        <p:txBody>
+          <a:bodyPr vert="horz" lIns="91440" tIns="45720" rIns="91440" bIns="45720" rtlCol="0" anchor="b">
+            <a:normAutofit/>
+          </a:bodyPr>
+          <a:lstStyle>
+            <a:lvl1pPr algn="ctr" defTabSz="914400" rtl="0" eaLnBrk="1" latinLnBrk="0" hangingPunct="1">
+              <a:lnSpc>
+                <a:spcPct val="90000"/>
+              </a:lnSpc>
+              <a:spcBef>
+                <a:spcPct val="0"/>
+              </a:spcBef>
+              <a:buNone/>
+              <a:defRPr sz="6000" kern="1200">
+                <a:solidFill>
+                  <a:schemeClr val="tx1"/>
+                </a:solidFill>
+                <a:latin typeface="+mj-lt"/>
+                <a:ea typeface="+mj-ea"/>
+                <a:cs typeface="+mj-cs"/>
+              </a:defRPr>
+            </a:lvl1pPr>
+          </a:lstStyle>
+          <a:p>
+            <a:r>
+              <a:rPr lang="en-US"/>
+              <a:t>CONSIDERAÇÕES FINAIS</a:t>
+            </a:r>
           </a:p>
         </p:txBody>
       </p:sp>
     </p:spTree>
     <p:extLst>
       <p:ext uri="{BB962C8B-B14F-4D97-AF65-F5344CB8AC3E}">
-        <p14:creationId xmlns:p14="http://schemas.microsoft.com/office/powerpoint/2010/main" val="47991561"/>
+        <p14:creationId xmlns:p14="http://schemas.microsoft.com/office/powerpoint/2010/main" val="149097043"/>
       </p:ext>
     </p:extLst>
   </p:cSld>
@@ -6427,6 +6970,380 @@
     <p:extLst>
       <p:ext uri="{BB962C8B-B14F-4D97-AF65-F5344CB8AC3E}">
         <p14:creationId xmlns:p14="http://schemas.microsoft.com/office/powerpoint/2010/main" val="3636393291"/>
+      </p:ext>
+    </p:extLst>
+  </p:cSld>
+  <p:clrMapOvr>
+    <a:masterClrMapping/>
+  </p:clrMapOvr>
+</p:sld>
+</file>
+
+<file path=ppt/slides/slide20.xml><?xml version="1.0" encoding="utf-8"?>
+<p:sld xmlns:a="http://schemas.openxmlformats.org/drawingml/2006/main" xmlns:r="http://schemas.openxmlformats.org/officeDocument/2006/relationships" xmlns:p="http://schemas.openxmlformats.org/presentationml/2006/main">
+  <p:cSld>
+    <p:spTree>
+      <p:nvGrpSpPr>
+        <p:cNvPr id="1" name=""/>
+        <p:cNvGrpSpPr/>
+        <p:nvPr/>
+      </p:nvGrpSpPr>
+      <p:grpSpPr>
+        <a:xfrm>
+          <a:off x="0" y="0"/>
+          <a:ext cx="0" cy="0"/>
+          <a:chOff x="0" y="0"/>
+          <a:chExt cx="0" cy="0"/>
+        </a:xfrm>
+      </p:grpSpPr>
+      <p:sp>
+        <p:nvSpPr>
+          <p:cNvPr id="2" name="Title 1">
+            <a:extLst>
+              <a:ext uri="{FF2B5EF4-FFF2-40B4-BE49-F238E27FC236}">
+                <a16:creationId xmlns:a16="http://schemas.microsoft.com/office/drawing/2014/main" id="{79003326-FD5F-6C4E-8F9C-898BFB962998}"/>
+              </a:ext>
+            </a:extLst>
+          </p:cNvPr>
+          <p:cNvSpPr>
+            <a:spLocks noGrp="1"/>
+          </p:cNvSpPr>
+          <p:nvPr>
+            <p:ph type="title"/>
+          </p:nvPr>
+        </p:nvSpPr>
+        <p:spPr/>
+        <p:txBody>
+          <a:bodyPr/>
+          <a:lstStyle/>
+          <a:p>
+            <a:r>
+              <a:rPr lang="en-US" err="1"/>
+              <a:t>Desafios</a:t>
+            </a:r>
+            <a:endParaRPr lang="en-US"/>
+          </a:p>
+        </p:txBody>
+      </p:sp>
+      <p:sp>
+        <p:nvSpPr>
+          <p:cNvPr id="3" name="Content Placeholder 2">
+            <a:extLst>
+              <a:ext uri="{FF2B5EF4-FFF2-40B4-BE49-F238E27FC236}">
+                <a16:creationId xmlns:a16="http://schemas.microsoft.com/office/drawing/2014/main" id="{AF284CC7-39D2-7A47-BE98-2335EEF07631}"/>
+              </a:ext>
+            </a:extLst>
+          </p:cNvPr>
+          <p:cNvSpPr>
+            <a:spLocks noGrp="1"/>
+          </p:cNvSpPr>
+          <p:nvPr>
+            <p:ph idx="1"/>
+          </p:nvPr>
+        </p:nvSpPr>
+        <p:spPr/>
+        <p:txBody>
+          <a:bodyPr/>
+          <a:lstStyle/>
+          <a:p>
+            <a:r>
+              <a:rPr lang="en-US" err="1"/>
+              <a:t>Instabilidade</a:t>
+            </a:r>
+            <a:r>
+              <a:rPr lang="en-US"/>
+              <a:t> da </a:t>
+            </a:r>
+            <a:r>
+              <a:rPr lang="en-US" err="1"/>
+              <a:t>linguagem</a:t>
+            </a:r>
+            <a:r>
+              <a:rPr lang="en-US"/>
+              <a:t> e das </a:t>
+            </a:r>
+            <a:r>
+              <a:rPr lang="en-US" err="1"/>
+              <a:t>bibliotecas</a:t>
+            </a:r>
+            <a:r>
+              <a:rPr lang="en-US"/>
+              <a:t>. </a:t>
+            </a:r>
+          </a:p>
+          <a:p>
+            <a:r>
+              <a:rPr lang="en-US" err="1"/>
+              <a:t>Documentação</a:t>
+            </a:r>
+            <a:r>
+              <a:rPr lang="en-US"/>
+              <a:t> </a:t>
+            </a:r>
+            <a:r>
+              <a:rPr lang="en-US" err="1"/>
+              <a:t>desatualizada</a:t>
+            </a:r>
+            <a:r>
+              <a:rPr lang="en-US"/>
+              <a:t> de </a:t>
+            </a:r>
+            <a:r>
+              <a:rPr lang="en-US" err="1"/>
+              <a:t>algumas</a:t>
+            </a:r>
+            <a:r>
+              <a:rPr lang="en-US"/>
+              <a:t> </a:t>
+            </a:r>
+            <a:r>
+              <a:rPr lang="en-US" err="1"/>
+              <a:t>bibliotecas</a:t>
+            </a:r>
+            <a:r>
+              <a:rPr lang="en-US"/>
+              <a:t>.</a:t>
+            </a:r>
+          </a:p>
+          <a:p>
+            <a:r>
+              <a:rPr lang="en-US" err="1"/>
+              <a:t>Aprender</a:t>
+            </a:r>
+            <a:r>
+              <a:rPr lang="en-US"/>
+              <a:t> a </a:t>
+            </a:r>
+            <a:r>
+              <a:rPr lang="en-US" err="1"/>
+              <a:t>utilizar</a:t>
+            </a:r>
+            <a:r>
+              <a:rPr lang="en-US"/>
+              <a:t> as </a:t>
+            </a:r>
+            <a:r>
+              <a:rPr lang="en-US" err="1"/>
+              <a:t>bibliotecas</a:t>
+            </a:r>
+            <a:r>
+              <a:rPr lang="en-US"/>
+              <a:t> do Watson e Facebook.</a:t>
+            </a:r>
+          </a:p>
+          <a:p>
+            <a:r>
+              <a:rPr lang="en-US"/>
+              <a:t>Bugs </a:t>
+            </a:r>
+            <a:r>
+              <a:rPr lang="en-US" err="1"/>
+              <a:t>na</a:t>
+            </a:r>
+            <a:r>
+              <a:rPr lang="en-US"/>
+              <a:t> </a:t>
+            </a:r>
+            <a:r>
+              <a:rPr lang="en-US" err="1"/>
+              <a:t>instalação</a:t>
+            </a:r>
+            <a:r>
+              <a:rPr lang="en-US"/>
+              <a:t> das </a:t>
+            </a:r>
+            <a:r>
+              <a:rPr lang="en-US" err="1"/>
+              <a:t>bibliotecas</a:t>
+            </a:r>
+            <a:r>
+              <a:rPr lang="en-US"/>
+              <a:t>, no </a:t>
+            </a:r>
+            <a:r>
+              <a:rPr lang="en-US" err="1"/>
+              <a:t>simulador</a:t>
+            </a:r>
+            <a:r>
+              <a:rPr lang="en-US"/>
+              <a:t> e </a:t>
+            </a:r>
+            <a:r>
+              <a:rPr lang="en-US" err="1"/>
+              <a:t>na</a:t>
+            </a:r>
+            <a:r>
+              <a:rPr lang="en-US"/>
+              <a:t> IDE.</a:t>
+            </a:r>
+          </a:p>
+          <a:p>
+            <a:r>
+              <a:rPr lang="en-US" err="1"/>
+              <a:t>Depuração</a:t>
+            </a:r>
+            <a:r>
+              <a:rPr lang="en-US"/>
+              <a:t>: </a:t>
+            </a:r>
+            <a:r>
+              <a:rPr lang="en-US" err="1"/>
+              <a:t>dificuldade</a:t>
+            </a:r>
+            <a:r>
+              <a:rPr lang="en-US"/>
+              <a:t> de </a:t>
+            </a:r>
+            <a:r>
+              <a:rPr lang="en-US" err="1"/>
+              <a:t>obtenção</a:t>
+            </a:r>
+            <a:r>
+              <a:rPr lang="en-US"/>
+              <a:t> de </a:t>
+            </a:r>
+            <a:r>
+              <a:rPr lang="en-US" err="1"/>
+              <a:t>informações</a:t>
+            </a:r>
+            <a:r>
+              <a:rPr lang="en-US"/>
+              <a:t> para </a:t>
+            </a:r>
+            <a:r>
+              <a:rPr lang="en-US" err="1"/>
+              <a:t>solução</a:t>
+            </a:r>
+            <a:r>
+              <a:rPr lang="en-US"/>
+              <a:t> dos </a:t>
+            </a:r>
+            <a:r>
+              <a:rPr lang="en-US" err="1"/>
+              <a:t>erros</a:t>
+            </a:r>
+            <a:r>
+              <a:rPr lang="en-US"/>
+              <a:t> </a:t>
+            </a:r>
+            <a:r>
+              <a:rPr lang="en-US" err="1"/>
+              <a:t>identificados</a:t>
+            </a:r>
+            <a:r>
+              <a:rPr lang="en-US"/>
+              <a:t> </a:t>
+            </a:r>
+            <a:r>
+              <a:rPr lang="en-US" err="1"/>
+              <a:t>durante</a:t>
+            </a:r>
+            <a:r>
+              <a:rPr lang="en-US"/>
+              <a:t> </a:t>
+            </a:r>
+            <a:r>
+              <a:rPr lang="en-US" err="1"/>
+              <a:t>os</a:t>
+            </a:r>
+            <a:r>
+              <a:rPr lang="en-US"/>
+              <a:t> testes</a:t>
+            </a:r>
+          </a:p>
+          <a:p>
+            <a:r>
+              <a:rPr lang="en-US" err="1"/>
+              <a:t>Desenvolver</a:t>
+            </a:r>
+            <a:r>
+              <a:rPr lang="en-US"/>
+              <a:t> um </a:t>
+            </a:r>
+            <a:r>
+              <a:rPr lang="en-US" err="1"/>
+              <a:t>algoritmo</a:t>
+            </a:r>
+            <a:r>
+              <a:rPr lang="en-US"/>
+              <a:t> de ranking para </a:t>
+            </a:r>
+            <a:r>
+              <a:rPr lang="en-US" err="1"/>
+              <a:t>oferecer</a:t>
+            </a:r>
+            <a:r>
+              <a:rPr lang="en-US"/>
+              <a:t> o </a:t>
+            </a:r>
+            <a:r>
+              <a:rPr lang="en-US" err="1"/>
+              <a:t>melhor</a:t>
+            </a:r>
+            <a:r>
+              <a:rPr lang="en-US"/>
+              <a:t> </a:t>
+            </a:r>
+            <a:r>
+              <a:rPr lang="en-US" err="1"/>
+              <a:t>resultado</a:t>
+            </a:r>
+            <a:r>
+              <a:rPr lang="en-US"/>
+              <a:t> </a:t>
+            </a:r>
+            <a:r>
+              <a:rPr lang="en-US" err="1"/>
+              <a:t>na</a:t>
+            </a:r>
+            <a:r>
+              <a:rPr lang="en-US"/>
+              <a:t> </a:t>
+            </a:r>
+            <a:r>
+              <a:rPr lang="en-US" err="1"/>
+              <a:t>busca</a:t>
+            </a:r>
+            <a:r>
+              <a:rPr lang="en-US"/>
+              <a:t> do </a:t>
+            </a:r>
+            <a:r>
+              <a:rPr lang="en-US" err="1"/>
+              <a:t>usuário</a:t>
+            </a:r>
+            <a:r>
+              <a:rPr lang="en-US"/>
+              <a:t>, Segundo </a:t>
+            </a:r>
+            <a:r>
+              <a:rPr lang="en-US" err="1"/>
+              <a:t>suas</a:t>
+            </a:r>
+            <a:r>
+              <a:rPr lang="en-US"/>
+              <a:t> </a:t>
+            </a:r>
+            <a:r>
+              <a:rPr lang="en-US" err="1"/>
+              <a:t>caracteristicas</a:t>
+            </a:r>
+            <a:r>
+              <a:rPr lang="en-US"/>
+              <a:t> de </a:t>
+            </a:r>
+            <a:r>
+              <a:rPr lang="en-US" err="1"/>
+              <a:t>personalidade</a:t>
+            </a:r>
+            <a:endParaRPr lang="en-US"/>
+          </a:p>
+        </p:txBody>
+      </p:sp>
+    </p:spTree>
+    <p:extLst>
+      <p:ext uri="{BB962C8B-B14F-4D97-AF65-F5344CB8AC3E}">
+        <p14:creationId xmlns:p14="http://schemas.microsoft.com/office/powerpoint/2010/main" val="47991561"/>
       </p:ext>
     </p:extLst>
   </p:cSld>

</xml_diff>